<commit_message>
Updated images in the presentation
</commit_message>
<xml_diff>
--- a/Presentation/final draft.pptx
+++ b/Presentation/final draft.pptx
@@ -5,7 +5,7 @@
     <p:sldMasterId id="2147484040" r:id="rId1"/>
   </p:sldMasterIdLst>
   <p:notesMasterIdLst>
-    <p:notesMasterId r:id="rId15"/>
+    <p:notesMasterId r:id="rId16"/>
   </p:notesMasterIdLst>
   <p:sldIdLst>
     <p:sldId id="256" r:id="rId2"/>
@@ -18,9 +18,10 @@
     <p:sldId id="279" r:id="rId9"/>
     <p:sldId id="257" r:id="rId10"/>
     <p:sldId id="274" r:id="rId11"/>
-    <p:sldId id="264" r:id="rId12"/>
-    <p:sldId id="267" r:id="rId13"/>
-    <p:sldId id="2441" r:id="rId14"/>
+    <p:sldId id="2442" r:id="rId12"/>
+    <p:sldId id="264" r:id="rId13"/>
+    <p:sldId id="267" r:id="rId14"/>
+    <p:sldId id="2441" r:id="rId15"/>
   </p:sldIdLst>
   <p:sldSz cx="12192000" cy="6858000"/>
   <p:notesSz cx="6858000" cy="9144000"/>
@@ -125,6 +126,18 @@
     </p:ext>
   </p:extLst>
 </p:presentation>
+</file>
+
+<file path=ppt/commentAuthors.xml><?xml version="1.0" encoding="utf-8"?>
+<p:cmAuthorLst xmlns:a="http://schemas.openxmlformats.org/drawingml/2006/main" xmlns:r="http://schemas.openxmlformats.org/officeDocument/2006/relationships" xmlns:p="http://schemas.openxmlformats.org/presentationml/2006/main">
+  <p:cmAuthor id="1" name="Christy Patrick" initials="CP" lastIdx="4" clrIdx="0">
+    <p:extLst>
+      <p:ext uri="{19B8F6BF-5375-455C-9EA6-DF929625EA0E}">
+        <p15:presenceInfo xmlns:p15="http://schemas.microsoft.com/office/powerpoint/2012/main" userId="8bf7bc2628abab3d" providerId="Windows Live"/>
+      </p:ext>
+    </p:extLst>
+  </p:cmAuthor>
+</p:cmAuthorLst>
 </file>
 
 <file path=ppt/diagrams/colors1.xml><?xml version="1.0" encoding="utf-8"?>
@@ -981,7 +994,7 @@
               <a:latin typeface="Arial" panose="020B0604020202020204" pitchFamily="34" charset="0"/>
               <a:cs typeface="Arial" panose="020B0604020202020204" pitchFamily="34" charset="0"/>
             </a:rPr>
-            <a:t>The Housing data </a:t>
+            <a:t>Housing data </a:t>
           </a:r>
         </a:p>
         <a:p>
@@ -1242,9 +1255,9 @@
   </dgm:ptLst>
   <dgm:cxnLst>
     <dgm:cxn modelId="{E0F63438-CD17-A942-BE3E-C45295D3E574}" type="presOf" srcId="{410C4F80-3800-4FA1-9131-12C5F993F8BE}" destId="{A6400FA0-CB38-4903-81AE-FA10885CBAF0}" srcOrd="0" destOrd="0" presId="urn:microsoft.com/office/officeart/2018/2/layout/IconVerticalSolidList"/>
+    <dgm:cxn modelId="{0042E95E-0285-8B44-850A-EA781E4C94EC}" type="presOf" srcId="{B5736282-1FF8-442E-8954-CE6FA3535B8A}" destId="{E41E5C61-0C28-488F-B8D1-417ABD633D8E}" srcOrd="0" destOrd="0" presId="urn:microsoft.com/office/officeart/2018/2/layout/IconVerticalSolidList"/>
     <dgm:cxn modelId="{EE6F9353-9921-4DAB-A2C5-FFB08FB73B21}" srcId="{B5736282-1FF8-442E-8954-CE6FA3535B8A}" destId="{62DC443B-C0E5-4B94-9A89-A3B6C7AE4601}" srcOrd="1" destOrd="0" parTransId="{D66DDCD2-24D8-4BF9-AEE9-388828958627}" sibTransId="{DB60C3A8-B474-404C-8E3B-EC522633BCAB}"/>
     <dgm:cxn modelId="{9473BC54-BB9B-4ACD-B6ED-E4F5CDF650F3}" srcId="{B5736282-1FF8-442E-8954-CE6FA3535B8A}" destId="{410C4F80-3800-4FA1-9131-12C5F993F8BE}" srcOrd="2" destOrd="0" parTransId="{D512A4DB-E5DF-4D7D-BAEB-144DC133E3DC}" sibTransId="{8720E948-0D0B-491B-B011-82701F9C7E63}"/>
-    <dgm:cxn modelId="{0042E95E-0285-8B44-850A-EA781E4C94EC}" type="presOf" srcId="{B5736282-1FF8-442E-8954-CE6FA3535B8A}" destId="{E41E5C61-0C28-488F-B8D1-417ABD633D8E}" srcOrd="0" destOrd="0" presId="urn:microsoft.com/office/officeart/2018/2/layout/IconVerticalSolidList"/>
     <dgm:cxn modelId="{4792059E-DC77-4C33-AC8E-FF51D356B405}" srcId="{B5736282-1FF8-442E-8954-CE6FA3535B8A}" destId="{78C17D28-ACA9-437B-B635-93296B674E5A}" srcOrd="0" destOrd="0" parTransId="{B5F31869-B37E-4357-AADD-685BE706EE2F}" sibTransId="{D7364149-4DA8-4B08-A7FF-EB901A73AFBD}"/>
     <dgm:cxn modelId="{1821499F-BB0B-6C44-98AC-E7085567E46D}" type="presOf" srcId="{62DC443B-C0E5-4B94-9A89-A3B6C7AE4601}" destId="{A93975DC-5C82-40BC-8D98-4276F0A9FFCA}" srcOrd="0" destOrd="0" presId="urn:microsoft.com/office/officeart/2018/2/layout/IconVerticalSolidList"/>
     <dgm:cxn modelId="{03EAEFFE-B392-AE4C-B793-A223FA81E04D}" type="presOf" srcId="{78C17D28-ACA9-437B-B635-93296B674E5A}" destId="{2C4F645D-2FD5-44D5-8462-FE0370F72E45}" srcOrd="0" destOrd="0" presId="urn:microsoft.com/office/officeart/2018/2/layout/IconVerticalSolidList"/>
@@ -1586,7 +1599,7 @@
               <a:latin typeface="Arial" panose="020B0604020202020204" pitchFamily="34" charset="0"/>
               <a:cs typeface="Arial" panose="020B0604020202020204" pitchFamily="34" charset="0"/>
             </a:rPr>
-            <a:t>The Housing data </a:t>
+            <a:t>Housing data </a:t>
           </a:r>
         </a:p>
         <a:p>
@@ -3214,7 +3227,7 @@
           <a:p>
             <a:fld id="{B9B6BCD5-E3BE-874C-A866-DD86D183A826}" type="datetimeFigureOut">
               <a:rPr lang="en-US" smtClean="0"/>
-              <a:t>9/19/20</a:t>
+              <a:t>9/20/2020</a:t>
             </a:fld>
             <a:endParaRPr lang="en-US"/>
           </a:p>
@@ -3635,51 +3648,15 @@
           <a:bodyPr/>
           <a:lstStyle/>
           <a:p>
-            <a:pPr algn="ctr"/>
             <a:r>
               <a:rPr lang="en-US" dirty="0"/>
-              <a:t>The graph on the left shows the relationship between Crime rate and Property Value. </a:t>
+              <a:t>For our analysis we want to exploit the variation in crime that occurs within cities from 2012-2018. </a:t>
             </a:r>
           </a:p>
           <a:p>
-            <a:pPr algn="ctr"/>
             <a:r>
               <a:rPr lang="en-US" dirty="0"/>
-              <a:t>The above chart shows the probability of the crime rate in the housing market between the cities from 2012-2018.</a:t>
-            </a:r>
-          </a:p>
-          <a:p>
-            <a:pPr algn="ctr"/>
-            <a:r>
-              <a:rPr lang="en-US" dirty="0"/>
-              <a:t>To do this we combine Information from the </a:t>
-            </a:r>
-            <a:r>
-              <a:rPr lang="en-US" u="sng" dirty="0"/>
-              <a:t>Redfin Housing Data </a:t>
-            </a:r>
-            <a:r>
-              <a:rPr lang="en-US" dirty="0"/>
-              <a:t>with a dataset from </a:t>
-            </a:r>
-          </a:p>
-          <a:p>
-            <a:pPr algn="ctr"/>
-            <a:r>
-              <a:rPr lang="en-US" dirty="0">
-                <a:hlinkClick r:id="rId3">
-                  <a:extLst>
-                    <a:ext uri="{A12FA001-AC4F-418D-AE19-62706E023703}">
-                      <ahyp:hlinkClr xmlns:ahyp="http://schemas.microsoft.com/office/drawing/2018/hyperlinkcolor" val="tx"/>
-                    </a:ext>
-                  </a:extLst>
-                </a:hlinkClick>
-              </a:rPr>
-              <a:t>UCR Publications | Federal Bureau of Investigation</a:t>
-            </a:r>
-            <a:r>
-              <a:rPr lang="en-US" dirty="0"/>
-              <a:t> to produce measure of crime changes between 2012-2018. </a:t>
+              <a:t>The proportion of crime in the area has a negative impact on the price. If the proportion of crime increases by one percentage point, prices are expected to drop by 1.5%.</a:t>
             </a:r>
           </a:p>
           <a:p>
@@ -3713,7 +3690,7 @@
     </p:spTree>
     <p:extLst>
       <p:ext uri="{BB962C8B-B14F-4D97-AF65-F5344CB8AC3E}">
-        <p14:creationId xmlns:p14="http://schemas.microsoft.com/office/powerpoint/2010/main" val="1483577430"/>
+        <p14:creationId xmlns:p14="http://schemas.microsoft.com/office/powerpoint/2010/main" val="4244874762"/>
       </p:ext>
     </p:extLst>
   </p:cSld>
@@ -3767,14 +3744,51 @@
           <a:bodyPr/>
           <a:lstStyle/>
           <a:p>
-            <a:pPr>
-              <a:spcAft>
-                <a:spcPts val="600"/>
-              </a:spcAft>
-            </a:pPr>
+            <a:pPr algn="ctr"/>
             <a:r>
-              <a:rPr lang="en-US" sz="1200" dirty="0"/>
-              <a:t>Crime concentrations are found in the metropolitan area. </a:t>
+              <a:rPr lang="en-US" dirty="0"/>
+              <a:t>The graph on the left shows the relationship between Crime rate and Property Value. </a:t>
+            </a:r>
+          </a:p>
+          <a:p>
+            <a:pPr algn="ctr"/>
+            <a:r>
+              <a:rPr lang="en-US" dirty="0"/>
+              <a:t>The above chart shows the probability of the crime rate in the housing market between the cities from 2012-2018.</a:t>
+            </a:r>
+          </a:p>
+          <a:p>
+            <a:pPr algn="ctr"/>
+            <a:r>
+              <a:rPr lang="en-US" dirty="0"/>
+              <a:t>To do this we combine Information from the </a:t>
+            </a:r>
+            <a:r>
+              <a:rPr lang="en-US" u="sng" dirty="0"/>
+              <a:t>Redfin Housing Data </a:t>
+            </a:r>
+            <a:r>
+              <a:rPr lang="en-US" dirty="0"/>
+              <a:t>with a dataset from </a:t>
+            </a:r>
+          </a:p>
+          <a:p>
+            <a:pPr algn="ctr"/>
+            <a:r>
+              <a:rPr lang="en-US" dirty="0">
+                <a:hlinkClick r:id="rId3">
+                  <a:extLst>
+                    <a:ext uri="{A12FA001-AC4F-418D-AE19-62706E023703}">
+                      <ahyp:hlinkClr xmlns:ahyp="http://schemas.microsoft.com/office/drawing/2018/hyperlinkcolor" val="tx"/>
+                    </a:ext>
+                  </a:extLst>
+                </a:hlinkClick>
+              </a:rPr>
+              <a:t>UCR Publications | Federal Bureau of Investigation</a:t>
+            </a:r>
+            <a:r>
+              <a:rPr lang="en-US" dirty="0"/>
+              <a:t> to produce measure of crime changes between 2012-2018. </a:t>
             </a:r>
           </a:p>
           <a:p>
@@ -3808,7 +3822,7 @@
     </p:spTree>
     <p:extLst>
       <p:ext uri="{BB962C8B-B14F-4D97-AF65-F5344CB8AC3E}">
-        <p14:creationId xmlns:p14="http://schemas.microsoft.com/office/powerpoint/2010/main" val="3749441230"/>
+        <p14:creationId xmlns:p14="http://schemas.microsoft.com/office/powerpoint/2010/main" val="1483577430"/>
       </p:ext>
     </p:extLst>
   </p:cSld>
@@ -3862,6 +3876,17 @@
           <a:bodyPr/>
           <a:lstStyle/>
           <a:p>
+            <a:pPr>
+              <a:spcAft>
+                <a:spcPts val="600"/>
+              </a:spcAft>
+            </a:pPr>
+            <a:r>
+              <a:rPr lang="en-US" sz="1200" dirty="0"/>
+              <a:t>Crime concentrations are found in the metropolitan area. </a:t>
+            </a:r>
+          </a:p>
+          <a:p>
             <a:endParaRPr lang="en-US" dirty="0"/>
           </a:p>
         </p:txBody>
@@ -3884,6 +3909,90 @@
             <a:fld id="{9A9FD09C-8CDE-EC44-8006-13D124DBA38F}" type="slidenum">
               <a:rPr lang="en-US" smtClean="0"/>
               <a:t>13</a:t>
+            </a:fld>
+            <a:endParaRPr lang="en-US"/>
+          </a:p>
+        </p:txBody>
+      </p:sp>
+    </p:spTree>
+    <p:extLst>
+      <p:ext uri="{BB962C8B-B14F-4D97-AF65-F5344CB8AC3E}">
+        <p14:creationId xmlns:p14="http://schemas.microsoft.com/office/powerpoint/2010/main" val="3749441230"/>
+      </p:ext>
+    </p:extLst>
+  </p:cSld>
+  <p:clrMapOvr>
+    <a:masterClrMapping/>
+  </p:clrMapOvr>
+</p:notes>
+</file>
+
+<file path=ppt/notesSlides/notesSlide13.xml><?xml version="1.0" encoding="utf-8"?>
+<p:notes xmlns:a="http://schemas.openxmlformats.org/drawingml/2006/main" xmlns:r="http://schemas.openxmlformats.org/officeDocument/2006/relationships" xmlns:p="http://schemas.openxmlformats.org/presentationml/2006/main">
+  <p:cSld>
+    <p:spTree>
+      <p:nvGrpSpPr>
+        <p:cNvPr id="1" name=""/>
+        <p:cNvGrpSpPr/>
+        <p:nvPr/>
+      </p:nvGrpSpPr>
+      <p:grpSpPr>
+        <a:xfrm>
+          <a:off x="0" y="0"/>
+          <a:ext cx="0" cy="0"/>
+          <a:chOff x="0" y="0"/>
+          <a:chExt cx="0" cy="0"/>
+        </a:xfrm>
+      </p:grpSpPr>
+      <p:sp>
+        <p:nvSpPr>
+          <p:cNvPr id="2" name="Slide Image Placeholder 1"/>
+          <p:cNvSpPr>
+            <a:spLocks noGrp="1" noRot="1" noChangeAspect="1"/>
+          </p:cNvSpPr>
+          <p:nvPr>
+            <p:ph type="sldImg"/>
+          </p:nvPr>
+        </p:nvSpPr>
+        <p:spPr/>
+      </p:sp>
+      <p:sp>
+        <p:nvSpPr>
+          <p:cNvPr id="3" name="Notes Placeholder 2"/>
+          <p:cNvSpPr>
+            <a:spLocks noGrp="1"/>
+          </p:cNvSpPr>
+          <p:nvPr>
+            <p:ph type="body" idx="1"/>
+          </p:nvPr>
+        </p:nvSpPr>
+        <p:spPr/>
+        <p:txBody>
+          <a:bodyPr/>
+          <a:lstStyle/>
+          <a:p>
+            <a:endParaRPr lang="en-US" dirty="0"/>
+          </a:p>
+        </p:txBody>
+      </p:sp>
+      <p:sp>
+        <p:nvSpPr>
+          <p:cNvPr id="4" name="Slide Number Placeholder 3"/>
+          <p:cNvSpPr>
+            <a:spLocks noGrp="1"/>
+          </p:cNvSpPr>
+          <p:nvPr>
+            <p:ph type="sldNum" sz="quarter" idx="5"/>
+          </p:nvPr>
+        </p:nvSpPr>
+        <p:spPr/>
+        <p:txBody>
+          <a:bodyPr/>
+          <a:lstStyle/>
+          <a:p>
+            <a:fld id="{9A9FD09C-8CDE-EC44-8006-13D124DBA38F}" type="slidenum">
+              <a:rPr lang="en-US" smtClean="0"/>
+              <a:t>14</a:t>
             </a:fld>
             <a:endParaRPr lang="en-US"/>
           </a:p>
@@ -4935,7 +5044,7 @@
             <a:fld id="{5586B75A-687E-405C-8A0B-8D00578BA2C3}" type="datetimeFigureOut">
               <a:rPr lang="en-US" smtClean="0"/>
               <a:pPr/>
-              <a:t>9/19/20</a:t>
+              <a:t>9/20/2020</a:t>
             </a:fld>
             <a:endParaRPr lang="en-US" dirty="0"/>
           </a:p>
@@ -5107,7 +5216,7 @@
             <a:fld id="{5586B75A-687E-405C-8A0B-8D00578BA2C3}" type="datetimeFigureOut">
               <a:rPr lang="en-US" smtClean="0"/>
               <a:pPr/>
-              <a:t>9/19/20</a:t>
+              <a:t>9/20/2020</a:t>
             </a:fld>
             <a:endParaRPr lang="en-US" dirty="0"/>
           </a:p>
@@ -5289,7 +5398,7 @@
             <a:fld id="{5586B75A-687E-405C-8A0B-8D00578BA2C3}" type="datetimeFigureOut">
               <a:rPr lang="en-US" smtClean="0"/>
               <a:pPr/>
-              <a:t>9/19/20</a:t>
+              <a:t>9/20/2020</a:t>
             </a:fld>
             <a:endParaRPr lang="en-US" dirty="0"/>
           </a:p>
@@ -6125,7 +6234,7 @@
             <a:fld id="{5586B75A-687E-405C-8A0B-8D00578BA2C3}" type="datetimeFigureOut">
               <a:rPr lang="en-US" smtClean="0"/>
               <a:pPr/>
-              <a:t>9/19/20</a:t>
+              <a:t>9/20/2020</a:t>
             </a:fld>
             <a:endParaRPr lang="en-US" dirty="0"/>
           </a:p>
@@ -6385,7 +6494,7 @@
             <a:fld id="{5586B75A-687E-405C-8A0B-8D00578BA2C3}" type="datetimeFigureOut">
               <a:rPr lang="en-US" smtClean="0"/>
               <a:pPr/>
-              <a:t>9/19/20</a:t>
+              <a:t>9/20/2020</a:t>
             </a:fld>
             <a:endParaRPr lang="en-US" dirty="0"/>
           </a:p>
@@ -6675,7 +6784,7 @@
             <a:fld id="{5586B75A-687E-405C-8A0B-8D00578BA2C3}" type="datetimeFigureOut">
               <a:rPr lang="en-US" smtClean="0"/>
               <a:pPr/>
-              <a:t>9/19/20</a:t>
+              <a:t>9/20/2020</a:t>
             </a:fld>
             <a:endParaRPr lang="en-US" dirty="0"/>
           </a:p>
@@ -7119,7 +7228,7 @@
             <a:fld id="{5586B75A-687E-405C-8A0B-8D00578BA2C3}" type="datetimeFigureOut">
               <a:rPr lang="en-US" smtClean="0"/>
               <a:pPr/>
-              <a:t>9/19/20</a:t>
+              <a:t>9/20/2020</a:t>
             </a:fld>
             <a:endParaRPr lang="en-US" dirty="0"/>
           </a:p>
@@ -7239,7 +7348,7 @@
             <a:fld id="{5586B75A-687E-405C-8A0B-8D00578BA2C3}" type="datetimeFigureOut">
               <a:rPr lang="en-US" smtClean="0"/>
               <a:pPr/>
-              <a:t>9/19/20</a:t>
+              <a:t>9/20/2020</a:t>
             </a:fld>
             <a:endParaRPr lang="en-US" dirty="0"/>
           </a:p>
@@ -7336,7 +7445,7 @@
             <a:fld id="{5586B75A-687E-405C-8A0B-8D00578BA2C3}" type="datetimeFigureOut">
               <a:rPr lang="en-US" smtClean="0"/>
               <a:pPr/>
-              <a:t>9/19/20</a:t>
+              <a:t>9/20/2020</a:t>
             </a:fld>
             <a:endParaRPr lang="en-US" dirty="0"/>
           </a:p>
@@ -7626,7 +7735,7 @@
             <a:fld id="{5586B75A-687E-405C-8A0B-8D00578BA2C3}" type="datetimeFigureOut">
               <a:rPr lang="en-US" smtClean="0"/>
               <a:pPr/>
-              <a:t>9/19/20</a:t>
+              <a:t>9/20/2020</a:t>
             </a:fld>
             <a:endParaRPr lang="en-US" dirty="0"/>
           </a:p>
@@ -7901,7 +8010,7 @@
             <a:fld id="{5586B75A-687E-405C-8A0B-8D00578BA2C3}" type="datetimeFigureOut">
               <a:rPr lang="en-US" smtClean="0"/>
               <a:pPr/>
-              <a:t>9/19/20</a:t>
+              <a:t>9/20/2020</a:t>
             </a:fld>
             <a:endParaRPr lang="en-US" dirty="0"/>
           </a:p>
@@ -8201,7 +8310,7 @@
             <a:fld id="{5586B75A-687E-405C-8A0B-8D00578BA2C3}" type="datetimeFigureOut">
               <a:rPr lang="en-US" smtClean="0"/>
               <a:pPr/>
-              <a:t>9/19/20</a:t>
+              <a:t>9/20/2020</a:t>
             </a:fld>
             <a:endParaRPr lang="en-US" dirty="0"/>
           </a:p>
@@ -8892,7 +9001,7 @@
                 <a:latin typeface="Arial" panose="020B0604020202020204" pitchFamily="34" charset="0"/>
                 <a:cs typeface="Arial" panose="020B0604020202020204" pitchFamily="34" charset="0"/>
               </a:rPr>
-              <a:t>Major Cities Housing Market in Relation to Crime Rate </a:t>
+              <a:t>Houston Metropolitan Area Housing Market in Relation to Crime Rate </a:t>
             </a:r>
           </a:p>
           <a:p>
@@ -9286,10 +9395,10 @@
       </p:sp>
       <p:pic>
         <p:nvPicPr>
-          <p:cNvPr id="23" name="Picture 22" descr="A screenshot of a cell phone&#10;&#10;Description automatically generated">
+          <p:cNvPr id="29" name="Picture 28" descr="A close up of a sign&#10;&#10;Description automatically generated">
             <a:extLst>
               <a:ext uri="{FF2B5EF4-FFF2-40B4-BE49-F238E27FC236}">
-                <a16:creationId xmlns:a16="http://schemas.microsoft.com/office/drawing/2014/main" id="{F4571214-CFD0-9442-B8B8-F974D47B2D82}"/>
+                <a16:creationId xmlns:a16="http://schemas.microsoft.com/office/drawing/2014/main" id="{8F11D508-E498-944E-B812-C24FDD29A667}"/>
               </a:ext>
             </a:extLst>
           </p:cNvPr>
@@ -9299,40 +9408,10 @@
           <p:nvPr/>
         </p:nvPicPr>
         <p:blipFill>
-          <a:blip r:embed="rId3"/>
-          <a:stretch>
-            <a:fillRect/>
-          </a:stretch>
-        </p:blipFill>
-        <p:spPr>
-          <a:xfrm>
-            <a:off x="3681488" y="951723"/>
-            <a:ext cx="8134376" cy="4954555"/>
-          </a:xfrm>
-          <a:prstGeom prst="rect">
-            <a:avLst/>
-          </a:prstGeom>
-        </p:spPr>
-      </p:pic>
-      <p:pic>
-        <p:nvPicPr>
-          <p:cNvPr id="29" name="Picture 28" descr="A close up of a sign&#10;&#10;Description automatically generated">
-            <a:extLst>
-              <a:ext uri="{FF2B5EF4-FFF2-40B4-BE49-F238E27FC236}">
-                <a16:creationId xmlns:a16="http://schemas.microsoft.com/office/drawing/2014/main" id="{8F11D508-E498-944E-B812-C24FDD29A667}"/>
-              </a:ext>
-            </a:extLst>
-          </p:cNvPr>
-          <p:cNvPicPr>
-            <a:picLocks noChangeAspect="1"/>
-          </p:cNvPicPr>
-          <p:nvPr/>
-        </p:nvPicPr>
-        <p:blipFill>
-          <a:blip r:embed="rId4">
+          <a:blip r:embed="rId3">
             <a:extLst>
               <a:ext uri="{837473B0-CC2E-450A-ABE3-18F120FF3D39}">
-                <a1611:picAttrSrcUrl xmlns:a1611="http://schemas.microsoft.com/office/drawing/2016/11/main" r:id="rId5"/>
+                <a1611:picAttrSrcUrl xmlns:a1611="http://schemas.microsoft.com/office/drawing/2016/11/main" r:id="rId4"/>
               </a:ext>
             </a:extLst>
           </a:blip>
@@ -9344,6 +9423,36 @@
           <a:xfrm>
             <a:off x="-7912" y="2017237"/>
             <a:ext cx="3577575" cy="2704053"/>
+          </a:xfrm>
+          <a:prstGeom prst="rect">
+            <a:avLst/>
+          </a:prstGeom>
+        </p:spPr>
+      </p:pic>
+      <p:pic>
+        <p:nvPicPr>
+          <p:cNvPr id="5" name="Picture 4" descr="A picture containing screenshot&#10;&#10;Description automatically generated">
+            <a:extLst>
+              <a:ext uri="{FF2B5EF4-FFF2-40B4-BE49-F238E27FC236}">
+                <a16:creationId xmlns:a16="http://schemas.microsoft.com/office/drawing/2014/main" id="{654F7FB8-C185-48B7-A78D-63184F049AF7}"/>
+              </a:ext>
+            </a:extLst>
+          </p:cNvPr>
+          <p:cNvPicPr>
+            <a:picLocks noChangeAspect="1"/>
+          </p:cNvPicPr>
+          <p:nvPr/>
+        </p:nvPicPr>
+        <p:blipFill>
+          <a:blip r:embed="rId5"/>
+          <a:stretch>
+            <a:fillRect/>
+          </a:stretch>
+        </p:blipFill>
+        <p:spPr>
+          <a:xfrm>
+            <a:off x="3588220" y="1100319"/>
+            <a:ext cx="8227644" cy="4936586"/>
           </a:xfrm>
           <a:prstGeom prst="rect">
             <a:avLst/>
@@ -9388,6 +9497,347 @@
           <a:chExt cx="0" cy="0"/>
         </a:xfrm>
       </p:grpSpPr>
+      <p:sp useBgFill="1">
+        <p:nvSpPr>
+          <p:cNvPr id="20" name="Rectangle 19">
+            <a:extLst>
+              <a:ext uri="{FF2B5EF4-FFF2-40B4-BE49-F238E27FC236}">
+                <a16:creationId xmlns:a16="http://schemas.microsoft.com/office/drawing/2014/main" id="{A35CBD63-8F8F-47DC-9CE7-159E6161D872}"/>
+              </a:ext>
+              <a:ext uri="{C183D7F6-B498-43B3-948B-1728B52AA6E4}">
+                <adec:decorative xmlns:adec="http://schemas.microsoft.com/office/drawing/2017/decorative" val="1"/>
+              </a:ext>
+            </a:extLst>
+          </p:cNvPr>
+          <p:cNvSpPr>
+            <a:spLocks noGrp="1" noRot="1" noChangeAspect="1" noMove="1" noResize="1" noEditPoints="1" noAdjustHandles="1" noChangeArrowheads="1" noChangeShapeType="1" noTextEdit="1"/>
+          </p:cNvSpPr>
+          <p:nvPr>
+            <p:extLst>
+              <p:ext uri="{386F3935-93C4-4BCD-93E2-E3B085C9AB24}">
+                <p16:designElem xmlns:p16="http://schemas.microsoft.com/office/powerpoint/2015/main" val="1"/>
+              </p:ext>
+            </p:extLst>
+          </p:nvPr>
+        </p:nvSpPr>
+        <p:spPr>
+          <a:xfrm>
+            <a:off x="0" y="0"/>
+            <a:ext cx="12192000" cy="6858000"/>
+          </a:xfrm>
+          <a:prstGeom prst="rect">
+            <a:avLst/>
+          </a:prstGeom>
+          <a:ln>
+            <a:noFill/>
+          </a:ln>
+        </p:spPr>
+        <p:style>
+          <a:lnRef idx="2">
+            <a:schemeClr val="accent1">
+              <a:shade val="50000"/>
+            </a:schemeClr>
+          </a:lnRef>
+          <a:fillRef idx="1">
+            <a:schemeClr val="accent1"/>
+          </a:fillRef>
+          <a:effectRef idx="0">
+            <a:schemeClr val="accent1"/>
+          </a:effectRef>
+          <a:fontRef idx="minor">
+            <a:schemeClr val="lt1"/>
+          </a:fontRef>
+        </p:style>
+        <p:txBody>
+          <a:bodyPr rtlCol="0" anchor="ctr"/>
+          <a:lstStyle/>
+          <a:p>
+            <a:pPr algn="ctr"/>
+            <a:endParaRPr lang="en-US"/>
+          </a:p>
+        </p:txBody>
+      </p:sp>
+      <p:sp>
+        <p:nvSpPr>
+          <p:cNvPr id="22" name="Rectangle 21">
+            <a:extLst>
+              <a:ext uri="{FF2B5EF4-FFF2-40B4-BE49-F238E27FC236}">
+                <a16:creationId xmlns:a16="http://schemas.microsoft.com/office/drawing/2014/main" id="{CA0E3486-FD49-4921-B4F4-E5BB5C88AC79}"/>
+              </a:ext>
+              <a:ext uri="{C183D7F6-B498-43B3-948B-1728B52AA6E4}">
+                <adec:decorative xmlns:adec="http://schemas.microsoft.com/office/drawing/2017/decorative" val="1"/>
+              </a:ext>
+            </a:extLst>
+          </p:cNvPr>
+          <p:cNvSpPr>
+            <a:spLocks noGrp="1" noRot="1" noChangeAspect="1" noMove="1" noResize="1" noEditPoints="1" noAdjustHandles="1" noChangeArrowheads="1" noChangeShapeType="1" noTextEdit="1"/>
+          </p:cNvSpPr>
+          <p:nvPr>
+            <p:extLst>
+              <p:ext uri="{386F3935-93C4-4BCD-93E2-E3B085C9AB24}">
+                <p16:designElem xmlns:p16="http://schemas.microsoft.com/office/powerpoint/2015/main" val="1"/>
+              </p:ext>
+            </p:extLst>
+          </p:nvPr>
+        </p:nvSpPr>
+        <p:spPr>
+          <a:xfrm>
+            <a:off x="-1" y="758953"/>
+            <a:ext cx="3577575" cy="5330952"/>
+          </a:xfrm>
+          <a:prstGeom prst="rect">
+            <a:avLst/>
+          </a:prstGeom>
+          <a:solidFill>
+            <a:schemeClr val="accent1"/>
+          </a:solidFill>
+          <a:ln>
+            <a:noFill/>
+          </a:ln>
+        </p:spPr>
+        <p:style>
+          <a:lnRef idx="2">
+            <a:schemeClr val="accent1">
+              <a:shade val="50000"/>
+            </a:schemeClr>
+          </a:lnRef>
+          <a:fillRef idx="1">
+            <a:schemeClr val="accent1"/>
+          </a:fillRef>
+          <a:effectRef idx="0">
+            <a:schemeClr val="accent1"/>
+          </a:effectRef>
+          <a:fontRef idx="minor">
+            <a:schemeClr val="lt1"/>
+          </a:fontRef>
+        </p:style>
+      </p:sp>
+      <p:sp>
+        <p:nvSpPr>
+          <p:cNvPr id="9" name="Title 4">
+            <a:extLst>
+              <a:ext uri="{FF2B5EF4-FFF2-40B4-BE49-F238E27FC236}">
+                <a16:creationId xmlns:a16="http://schemas.microsoft.com/office/drawing/2014/main" id="{B3BCF04F-53F8-EB44-86BC-8E673A80BEE2}"/>
+              </a:ext>
+            </a:extLst>
+          </p:cNvPr>
+          <p:cNvSpPr txBox="1">
+            <a:spLocks/>
+          </p:cNvSpPr>
+          <p:nvPr/>
+        </p:nvSpPr>
+        <p:spPr>
+          <a:xfrm>
+            <a:off x="74501" y="821095"/>
+            <a:ext cx="3577575" cy="1038177"/>
+          </a:xfrm>
+          <a:prstGeom prst="rect">
+            <a:avLst/>
+          </a:prstGeom>
+        </p:spPr>
+        <p:txBody>
+          <a:bodyPr vert="horz" lIns="91440" tIns="45720" rIns="91440" bIns="45720" rtlCol="0" anchor="b">
+            <a:normAutofit/>
+          </a:bodyPr>
+          <a:lstStyle>
+            <a:lvl1pPr algn="l" defTabSz="914400" rtl="0" eaLnBrk="1" latinLnBrk="0" hangingPunct="1">
+              <a:lnSpc>
+                <a:spcPct val="90000"/>
+              </a:lnSpc>
+              <a:spcBef>
+                <a:spcPct val="0"/>
+              </a:spcBef>
+              <a:buNone/>
+              <a:defRPr sz="4400" kern="1200">
+                <a:solidFill>
+                  <a:schemeClr val="tx1"/>
+                </a:solidFill>
+                <a:latin typeface="+mj-lt"/>
+                <a:ea typeface="+mj-ea"/>
+                <a:cs typeface="+mj-cs"/>
+              </a:defRPr>
+            </a:lvl1pPr>
+          </a:lstStyle>
+          <a:p>
+            <a:pPr>
+              <a:spcAft>
+                <a:spcPts val="600"/>
+              </a:spcAft>
+            </a:pPr>
+            <a:r>
+              <a:rPr lang="en-US" sz="2800" b="1" spc="-60" dirty="0">
+                <a:solidFill>
+                  <a:srgbClr val="FFFFFF"/>
+                </a:solidFill>
+                <a:latin typeface="Arial" panose="020B0604020202020204" pitchFamily="34" charset="0"/>
+                <a:cs typeface="Arial" panose="020B0604020202020204" pitchFamily="34" charset="0"/>
+              </a:rPr>
+              <a:t>AVERAGE Days on Market</a:t>
+            </a:r>
+          </a:p>
+        </p:txBody>
+      </p:sp>
+      <p:sp>
+        <p:nvSpPr>
+          <p:cNvPr id="24" name="Rectangle 23">
+            <a:extLst>
+              <a:ext uri="{FF2B5EF4-FFF2-40B4-BE49-F238E27FC236}">
+                <a16:creationId xmlns:a16="http://schemas.microsoft.com/office/drawing/2014/main" id="{83B4A72C-2924-4CE2-8674-7E02E182ED6D}"/>
+              </a:ext>
+              <a:ext uri="{C183D7F6-B498-43B3-948B-1728B52AA6E4}">
+                <adec:decorative xmlns:adec="http://schemas.microsoft.com/office/drawing/2017/decorative" val="1"/>
+              </a:ext>
+            </a:extLst>
+          </p:cNvPr>
+          <p:cNvSpPr>
+            <a:spLocks noGrp="1" noRot="1" noChangeAspect="1" noMove="1" noResize="1" noEditPoints="1" noAdjustHandles="1" noChangeArrowheads="1" noChangeShapeType="1" noTextEdit="1"/>
+          </p:cNvSpPr>
+          <p:nvPr>
+            <p:extLst>
+              <p:ext uri="{386F3935-93C4-4BCD-93E2-E3B085C9AB24}">
+                <p16:designElem xmlns:p16="http://schemas.microsoft.com/office/powerpoint/2015/main" val="1"/>
+              </p:ext>
+            </p:extLst>
+          </p:nvPr>
+        </p:nvSpPr>
+        <p:spPr>
+          <a:xfrm>
+            <a:off x="11815864" y="758952"/>
+            <a:ext cx="384048" cy="5330952"/>
+          </a:xfrm>
+          <a:prstGeom prst="rect">
+            <a:avLst/>
+          </a:prstGeom>
+          <a:solidFill>
+            <a:srgbClr val="C8C8C8">
+              <a:alpha val="49804"/>
+            </a:srgbClr>
+          </a:solidFill>
+          <a:ln>
+            <a:noFill/>
+          </a:ln>
+        </p:spPr>
+        <p:style>
+          <a:lnRef idx="2">
+            <a:schemeClr val="accent1">
+              <a:shade val="50000"/>
+            </a:schemeClr>
+          </a:lnRef>
+          <a:fillRef idx="1">
+            <a:schemeClr val="accent1"/>
+          </a:fillRef>
+          <a:effectRef idx="0">
+            <a:schemeClr val="accent1"/>
+          </a:effectRef>
+          <a:fontRef idx="minor">
+            <a:schemeClr val="lt1"/>
+          </a:fontRef>
+        </p:style>
+      </p:sp>
+      <p:pic>
+        <p:nvPicPr>
+          <p:cNvPr id="29" name="Picture 28" descr="A close up of a sign&#10;&#10;Description automatically generated">
+            <a:extLst>
+              <a:ext uri="{FF2B5EF4-FFF2-40B4-BE49-F238E27FC236}">
+                <a16:creationId xmlns:a16="http://schemas.microsoft.com/office/drawing/2014/main" id="{8F11D508-E498-944E-B812-C24FDD29A667}"/>
+              </a:ext>
+            </a:extLst>
+          </p:cNvPr>
+          <p:cNvPicPr>
+            <a:picLocks noChangeAspect="1"/>
+          </p:cNvPicPr>
+          <p:nvPr/>
+        </p:nvPicPr>
+        <p:blipFill>
+          <a:blip r:embed="rId3">
+            <a:extLst>
+              <a:ext uri="{837473B0-CC2E-450A-ABE3-18F120FF3D39}">
+                <a1611:picAttrSrcUrl xmlns:a1611="http://schemas.microsoft.com/office/drawing/2016/11/main" r:id="rId4"/>
+              </a:ext>
+            </a:extLst>
+          </a:blip>
+          <a:stretch>
+            <a:fillRect/>
+          </a:stretch>
+        </p:blipFill>
+        <p:spPr>
+          <a:xfrm>
+            <a:off x="-7912" y="2017237"/>
+            <a:ext cx="3577575" cy="2704053"/>
+          </a:xfrm>
+          <a:prstGeom prst="rect">
+            <a:avLst/>
+          </a:prstGeom>
+        </p:spPr>
+      </p:pic>
+      <p:pic>
+        <p:nvPicPr>
+          <p:cNvPr id="6" name="Picture 5" descr="A picture containing screenshot&#10;&#10;Description automatically generated">
+            <a:extLst>
+              <a:ext uri="{FF2B5EF4-FFF2-40B4-BE49-F238E27FC236}">
+                <a16:creationId xmlns:a16="http://schemas.microsoft.com/office/drawing/2014/main" id="{79A431D6-5833-4F24-9DC5-39DBE41398E8}"/>
+              </a:ext>
+            </a:extLst>
+          </p:cNvPr>
+          <p:cNvPicPr>
+            <a:picLocks noChangeAspect="1"/>
+          </p:cNvPicPr>
+          <p:nvPr/>
+        </p:nvPicPr>
+        <p:blipFill>
+          <a:blip r:embed="rId5"/>
+          <a:stretch>
+            <a:fillRect/>
+          </a:stretch>
+        </p:blipFill>
+        <p:spPr>
+          <a:xfrm>
+            <a:off x="3588221" y="956135"/>
+            <a:ext cx="8227643" cy="4936586"/>
+          </a:xfrm>
+          <a:prstGeom prst="rect">
+            <a:avLst/>
+          </a:prstGeom>
+        </p:spPr>
+      </p:pic>
+    </p:spTree>
+    <p:extLst>
+      <p:ext uri="{BB962C8B-B14F-4D97-AF65-F5344CB8AC3E}">
+        <p14:creationId xmlns:p14="http://schemas.microsoft.com/office/powerpoint/2010/main" val="2591689158"/>
+      </p:ext>
+    </p:extLst>
+  </p:cSld>
+  <p:clrMapOvr>
+    <a:masterClrMapping/>
+  </p:clrMapOvr>
+</p:sld>
+</file>
+
+<file path=ppt/slides/slide12.xml><?xml version="1.0" encoding="utf-8"?>
+<p:sld xmlns:a="http://schemas.openxmlformats.org/drawingml/2006/main" xmlns:r="http://schemas.openxmlformats.org/officeDocument/2006/relationships" xmlns:p="http://schemas.openxmlformats.org/presentationml/2006/main">
+  <p:cSld>
+    <p:bg>
+      <p:bgPr>
+        <a:solidFill>
+          <a:schemeClr val="bg1"/>
+        </a:solidFill>
+        <a:effectLst/>
+      </p:bgPr>
+    </p:bg>
+    <p:spTree>
+      <p:nvGrpSpPr>
+        <p:cNvPr id="1" name=""/>
+        <p:cNvGrpSpPr/>
+        <p:nvPr/>
+      </p:nvGrpSpPr>
+      <p:grpSpPr>
+        <a:xfrm>
+          <a:off x="0" y="0"/>
+          <a:ext cx="0" cy="0"/>
+          <a:chOff x="0" y="0"/>
+          <a:chExt cx="0" cy="0"/>
+        </a:xfrm>
+      </p:grpSpPr>
       <p:sp>
         <p:nvSpPr>
           <p:cNvPr id="4" name="Title 3">
@@ -9542,7 +9992,7 @@
 </p:sld>
 </file>
 
-<file path=ppt/slides/slide12.xml><?xml version="1.0" encoding="utf-8"?>
+<file path=ppt/slides/slide13.xml><?xml version="1.0" encoding="utf-8"?>
 <p:sld xmlns:a="http://schemas.openxmlformats.org/drawingml/2006/main" xmlns:r="http://schemas.openxmlformats.org/officeDocument/2006/relationships" xmlns:p="http://schemas.openxmlformats.org/presentationml/2006/main">
   <p:cSld>
     <p:bg>
@@ -10304,7 +10754,7 @@
 </p:sld>
 </file>
 
-<file path=ppt/slides/slide13.xml><?xml version="1.0" encoding="utf-8"?>
+<file path=ppt/slides/slide14.xml><?xml version="1.0" encoding="utf-8"?>
 <p:sld xmlns:a="http://schemas.openxmlformats.org/drawingml/2006/main" xmlns:r="http://schemas.openxmlformats.org/officeDocument/2006/relationships" xmlns:p="http://schemas.openxmlformats.org/presentationml/2006/main">
   <p:cSld>
     <p:bg>
@@ -11269,7 +11719,7 @@
             <a:fld id="{8C2E478F-E849-4A8C-AF1F-CBCC78A7CBFA}" type="slidenum">
               <a:rPr lang="en-US" smtClean="0"/>
               <a:pPr/>
-              <a:t>13</a:t>
+              <a:t>14</a:t>
             </a:fld>
             <a:endParaRPr lang="en-US" dirty="0"/>
           </a:p>
@@ -12197,7 +12647,7 @@
             <p:ph idx="1"/>
             <p:extLst>
               <p:ext uri="{D42A27DB-BD31-4B8C-83A1-F6EECF244321}">
-                <p14:modId xmlns:p14="http://schemas.microsoft.com/office/powerpoint/2010/main" val="3261933066"/>
+                <p14:modId xmlns:p14="http://schemas.microsoft.com/office/powerpoint/2010/main" val="3762253129"/>
               </p:ext>
             </p:extLst>
           </p:nvPr>
@@ -12396,7 +12846,7 @@
         </p:spPr>
         <p:txBody>
           <a:bodyPr>
-            <a:normAutofit/>
+            <a:normAutofit fontScale="90000"/>
           </a:bodyPr>
           <a:lstStyle/>
           <a:p>
@@ -12744,6 +13194,35 @@
           <a:chExt cx="0" cy="0"/>
         </a:xfrm>
       </p:grpSpPr>
+      <p:pic>
+        <p:nvPicPr>
+          <p:cNvPr id="4" name="Picture 3" descr="A close up of a map&#10;&#10;Description automatically generated">
+            <a:extLst>
+              <a:ext uri="{FF2B5EF4-FFF2-40B4-BE49-F238E27FC236}">
+                <a16:creationId xmlns:a16="http://schemas.microsoft.com/office/drawing/2014/main" id="{0B93855C-1812-473F-9DE7-0AACA02649FE}"/>
+              </a:ext>
+            </a:extLst>
+          </p:cNvPr>
+          <p:cNvPicPr>
+            <a:picLocks noChangeAspect="1"/>
+          </p:cNvPicPr>
+          <p:nvPr/>
+        </p:nvPicPr>
+        <p:blipFill rotWithShape="1">
+          <a:blip r:embed="rId3"/>
+          <a:srcRect l="6407" t="6366" r="7466" b="5609"/>
+          <a:stretch/>
+        </p:blipFill>
+        <p:spPr>
+          <a:xfrm>
+            <a:off x="3508741" y="900339"/>
+            <a:ext cx="8223947" cy="5043257"/>
+          </a:xfrm>
+          <a:prstGeom prst="rect">
+            <a:avLst/>
+          </a:prstGeom>
+        </p:spPr>
+      </p:pic>
       <p:sp>
         <p:nvSpPr>
           <p:cNvPr id="2" name="TextBox 1">
@@ -12796,35 +13275,6 @@
           </a:p>
         </p:txBody>
       </p:sp>
-      <p:pic>
-        <p:nvPicPr>
-          <p:cNvPr id="7" name="Content Placeholder 6" descr="A close up of a map&#10;&#10;Description automatically generated">
-            <a:extLst>
-              <a:ext uri="{FF2B5EF4-FFF2-40B4-BE49-F238E27FC236}">
-                <a16:creationId xmlns:a16="http://schemas.microsoft.com/office/drawing/2014/main" id="{CEAE0CF0-B9A7-9349-BB1E-50C929F9DCB2}"/>
-              </a:ext>
-            </a:extLst>
-          </p:cNvPr>
-          <p:cNvPicPr>
-            <a:picLocks noChangeAspect="1"/>
-          </p:cNvPicPr>
-          <p:nvPr/>
-        </p:nvPicPr>
-        <p:blipFill rotWithShape="1">
-          <a:blip r:embed="rId3"/>
-          <a:srcRect l="1983" r="2519" b="-1"/>
-          <a:stretch/>
-        </p:blipFill>
-        <p:spPr>
-          <a:xfrm>
-            <a:off x="3778897" y="758952"/>
-            <a:ext cx="7772401" cy="5330952"/>
-          </a:xfrm>
-          <a:prstGeom prst="rect">
-            <a:avLst/>
-          </a:prstGeom>
-        </p:spPr>
-      </p:pic>
       <p:pic>
         <p:nvPicPr>
           <p:cNvPr id="26" name="Picture 25" descr="A car parked in a parking lot&#10;&#10;Description automatically generated">
@@ -13200,8 +13650,8 @@
         </p:blipFill>
         <p:spPr>
           <a:xfrm>
-            <a:off x="4851961" y="1129907"/>
-            <a:ext cx="6882152" cy="4398862"/>
+            <a:off x="4727962" y="1129906"/>
+            <a:ext cx="7006152" cy="4478119"/>
           </a:xfrm>
           <a:prstGeom prst="rect">
             <a:avLst/>
@@ -13265,36 +13715,35 @@
           </a:fontRef>
         </p:style>
       </p:sp>
-      <p:sp>
-        <p:nvSpPr>
-          <p:cNvPr id="71" name="Content Placeholder 4">
+      <p:pic>
+        <p:nvPicPr>
+          <p:cNvPr id="4" name="Content Placeholder 3" descr="A picture containing screenshot&#10;&#10;Description automatically generated">
             <a:extLst>
               <a:ext uri="{FF2B5EF4-FFF2-40B4-BE49-F238E27FC236}">
-                <a16:creationId xmlns:a16="http://schemas.microsoft.com/office/drawing/2014/main" id="{8AB4822E-0C7B-7543-97A4-CB2A37A41ED9}"/>
+                <a16:creationId xmlns:a16="http://schemas.microsoft.com/office/drawing/2014/main" id="{D7673217-906D-45CD-813D-10A8139B20BB}"/>
               </a:ext>
             </a:extLst>
           </p:cNvPr>
-          <p:cNvSpPr>
-            <a:spLocks noGrp="1"/>
-          </p:cNvSpPr>
+          <p:cNvPicPr>
+            <a:picLocks noGrp="1" noChangeAspect="1"/>
+          </p:cNvPicPr>
           <p:nvPr>
             <p:ph sz="half" idx="1"/>
           </p:nvPr>
-        </p:nvSpPr>
+        </p:nvPicPr>
+        <p:blipFill>
+          <a:blip r:embed="rId3"/>
+          <a:stretch>
+            <a:fillRect/>
+          </a:stretch>
+        </p:blipFill>
         <p:spPr>
           <a:xfrm>
-            <a:off x="0" y="1785692"/>
-            <a:ext cx="4642228" cy="3743077"/>
+            <a:off x="0" y="2265045"/>
+            <a:ext cx="4641850" cy="2785110"/>
           </a:xfrm>
         </p:spPr>
-        <p:txBody>
-          <a:bodyPr/>
-          <a:lstStyle/>
-          <a:p>
-            <a:endParaRPr lang="en-US" dirty="0"/>
-          </a:p>
-        </p:txBody>
-      </p:sp>
+      </p:pic>
       <p:pic>
         <p:nvPicPr>
           <p:cNvPr id="18" name="Picture 17" descr="A picture containing indoor, sitting, table, front&#10;&#10;Description automatically generated">
@@ -13887,12 +14336,12 @@
           <a:chExt cx="0" cy="0"/>
         </a:xfrm>
       </p:grpSpPr>
-      <p:sp useBgFill="1">
-        <p:nvSpPr>
-          <p:cNvPr id="8" name="Rectangle 7">
+      <p:sp>
+        <p:nvSpPr>
+          <p:cNvPr id="21" name="Rectangle 20">
             <a:extLst>
               <a:ext uri="{FF2B5EF4-FFF2-40B4-BE49-F238E27FC236}">
-                <a16:creationId xmlns:a16="http://schemas.microsoft.com/office/drawing/2014/main" id="{29DC5A77-10C9-4ECF-B7EB-8D917F36A9EE}"/>
+                <a16:creationId xmlns:a16="http://schemas.microsoft.com/office/drawing/2014/main" id="{DB8424AB-D56B-4256-866A-5B54DE93C20F}"/>
               </a:ext>
               <a:ext uri="{C183D7F6-B498-43B3-948B-1728B52AA6E4}">
                 <adec:decorative xmlns:adec="http://schemas.microsoft.com/office/drawing/2017/decorative" val="1"/>
@@ -13912,68 +14361,8 @@
         </p:nvSpPr>
         <p:spPr>
           <a:xfrm>
-            <a:off x="0" y="0"/>
-            <a:ext cx="12192000" cy="6858000"/>
-          </a:xfrm>
-          <a:prstGeom prst="rect">
-            <a:avLst/>
-          </a:prstGeom>
-          <a:ln>
-            <a:noFill/>
-          </a:ln>
-        </p:spPr>
-        <p:style>
-          <a:lnRef idx="2">
-            <a:schemeClr val="accent1">
-              <a:shade val="50000"/>
-            </a:schemeClr>
-          </a:lnRef>
-          <a:fillRef idx="1">
-            <a:schemeClr val="accent1"/>
-          </a:fillRef>
-          <a:effectRef idx="0">
-            <a:schemeClr val="accent1"/>
-          </a:effectRef>
-          <a:fontRef idx="minor">
-            <a:schemeClr val="lt1"/>
-          </a:fontRef>
-        </p:style>
-        <p:txBody>
-          <a:bodyPr rtlCol="0" anchor="ctr"/>
-          <a:lstStyle/>
-          <a:p>
-            <a:pPr algn="ctr"/>
-            <a:endParaRPr lang="en-US"/>
-          </a:p>
-        </p:txBody>
-      </p:sp>
-      <p:sp>
-        <p:nvSpPr>
-          <p:cNvPr id="10" name="Rectangle 9">
-            <a:extLst>
-              <a:ext uri="{FF2B5EF4-FFF2-40B4-BE49-F238E27FC236}">
-                <a16:creationId xmlns:a16="http://schemas.microsoft.com/office/drawing/2014/main" id="{2FFE28B5-FB16-49A9-B851-3C35FAC0CACB}"/>
-              </a:ext>
-              <a:ext uri="{C183D7F6-B498-43B3-948B-1728B52AA6E4}">
-                <adec:decorative xmlns:adec="http://schemas.microsoft.com/office/drawing/2017/decorative" val="1"/>
-              </a:ext>
-            </a:extLst>
-          </p:cNvPr>
-          <p:cNvSpPr>
-            <a:spLocks noGrp="1" noRot="1" noChangeAspect="1" noMove="1" noResize="1" noEditPoints="1" noAdjustHandles="1" noChangeArrowheads="1" noChangeShapeType="1" noTextEdit="1"/>
-          </p:cNvSpPr>
-          <p:nvPr>
-            <p:extLst>
-              <p:ext uri="{386F3935-93C4-4BCD-93E2-E3B085C9AB24}">
-                <p16:designElem xmlns:p16="http://schemas.microsoft.com/office/powerpoint/2015/main" val="1"/>
-              </p:ext>
-            </p:extLst>
-          </p:nvPr>
-        </p:nvSpPr>
-        <p:spPr>
-          <a:xfrm>
-            <a:off x="1" y="758952"/>
-            <a:ext cx="10905976" cy="1651133"/>
+            <a:off x="0" y="761999"/>
+            <a:ext cx="9141619" cy="5334001"/>
           </a:xfrm>
           <a:prstGeom prst="rect">
             <a:avLst/>
@@ -14001,59 +14390,13 @@
             <a:schemeClr val="lt1"/>
           </a:fontRef>
         </p:style>
-        <p:txBody>
-          <a:bodyPr/>
-          <a:lstStyle/>
-          <a:p>
-            <a:endParaRPr lang="en-US" dirty="0"/>
-          </a:p>
-        </p:txBody>
-      </p:sp>
-      <p:sp>
-        <p:nvSpPr>
-          <p:cNvPr id="2" name="Title 1">
+      </p:sp>
+      <p:sp>
+        <p:nvSpPr>
+          <p:cNvPr id="23" name="Rectangle 22">
             <a:extLst>
               <a:ext uri="{FF2B5EF4-FFF2-40B4-BE49-F238E27FC236}">
-                <a16:creationId xmlns:a16="http://schemas.microsoft.com/office/drawing/2014/main" id="{2135BBC7-B59A-6D41-8796-3BC756EB830B}"/>
-              </a:ext>
-            </a:extLst>
-          </p:cNvPr>
-          <p:cNvSpPr>
-            <a:spLocks noGrp="1"/>
-          </p:cNvSpPr>
-          <p:nvPr>
-            <p:ph type="title"/>
-          </p:nvPr>
-        </p:nvSpPr>
-        <p:spPr>
-          <a:xfrm>
-            <a:off x="158228" y="1084029"/>
-            <a:ext cx="7716809" cy="1000978"/>
-          </a:xfrm>
-        </p:spPr>
-        <p:txBody>
-          <a:bodyPr>
-            <a:normAutofit/>
-          </a:bodyPr>
-          <a:lstStyle/>
-          <a:p>
-            <a:r>
-              <a:rPr lang="en-US" sz="2800" b="1" dirty="0">
-                <a:latin typeface="Arial" panose="020B0604020202020204" pitchFamily="34" charset="0"/>
-                <a:cs typeface="Arial" panose="020B0604020202020204" pitchFamily="34" charset="0"/>
-              </a:rPr>
-              <a:t>TOTAL CRIME AVG. PER CAPITA IN CITIES</a:t>
-            </a:r>
-            <a:endParaRPr lang="en-US" sz="2800" dirty="0"/>
-          </a:p>
-        </p:txBody>
-      </p:sp>
-      <p:sp>
-        <p:nvSpPr>
-          <p:cNvPr id="12" name="Rectangle 11">
-            <a:extLst>
-              <a:ext uri="{FF2B5EF4-FFF2-40B4-BE49-F238E27FC236}">
-                <a16:creationId xmlns:a16="http://schemas.microsoft.com/office/drawing/2014/main" id="{01014442-855A-4E0F-8D09-C314661A48B9}"/>
+                <a16:creationId xmlns:a16="http://schemas.microsoft.com/office/drawing/2014/main" id="{FC999C28-AD33-4EB7-A5F1-C06D10A5FDF7}"/>
               </a:ext>
               <a:ext uri="{C183D7F6-B498-43B3-948B-1728B52AA6E4}">
                 <adec:decorative xmlns:adec="http://schemas.microsoft.com/office/drawing/2017/decorative" val="1"/>
@@ -14073,8 +14416,8 @@
         </p:nvSpPr>
         <p:spPr>
           <a:xfrm>
-            <a:off x="11014533" y="758952"/>
-            <a:ext cx="1185379" cy="1651133"/>
+            <a:off x="9270263" y="761999"/>
+            <a:ext cx="2925318" cy="5334001"/>
           </a:xfrm>
           <a:prstGeom prst="rect">
             <a:avLst/>
@@ -14105,12 +14448,12 @@
           </a:fontRef>
         </p:style>
       </p:sp>
-      <p:sp>
-        <p:nvSpPr>
-          <p:cNvPr id="14" name="Rectangle 13">
+      <p:sp useBgFill="1">
+        <p:nvSpPr>
+          <p:cNvPr id="25" name="Rectangle 24">
             <a:extLst>
               <a:ext uri="{FF2B5EF4-FFF2-40B4-BE49-F238E27FC236}">
-                <a16:creationId xmlns:a16="http://schemas.microsoft.com/office/drawing/2014/main" id="{9B1ABF09-86CF-414E-88A5-2B84CC7232A9}"/>
+                <a16:creationId xmlns:a16="http://schemas.microsoft.com/office/drawing/2014/main" id="{0864E5C9-52C9-4572-AC75-548B9B9C2648}"/>
               </a:ext>
               <a:ext uri="{C183D7F6-B498-43B3-948B-1728B52AA6E4}">
                 <adec:decorative xmlns:adec="http://schemas.microsoft.com/office/drawing/2017/decorative" val="1"/>
@@ -14130,8 +14473,188 @@
         </p:nvSpPr>
         <p:spPr>
           <a:xfrm>
-            <a:off x="763" y="2526526"/>
-            <a:ext cx="1169701" cy="3563378"/>
+            <a:off x="0" y="0"/>
+            <a:ext cx="12191999" cy="6858000"/>
+          </a:xfrm>
+          <a:prstGeom prst="rect">
+            <a:avLst/>
+          </a:prstGeom>
+          <a:ln>
+            <a:noFill/>
+          </a:ln>
+        </p:spPr>
+        <p:style>
+          <a:lnRef idx="2">
+            <a:schemeClr val="accent1">
+              <a:shade val="50000"/>
+            </a:schemeClr>
+          </a:lnRef>
+          <a:fillRef idx="1">
+            <a:schemeClr val="accent1"/>
+          </a:fillRef>
+          <a:effectRef idx="0">
+            <a:schemeClr val="accent1"/>
+          </a:effectRef>
+          <a:fontRef idx="minor">
+            <a:schemeClr val="lt1"/>
+          </a:fontRef>
+        </p:style>
+        <p:txBody>
+          <a:bodyPr rtlCol="0" anchor="ctr"/>
+          <a:lstStyle/>
+          <a:p>
+            <a:pPr algn="ctr"/>
+            <a:endParaRPr lang="en-US"/>
+          </a:p>
+        </p:txBody>
+      </p:sp>
+      <p:sp>
+        <p:nvSpPr>
+          <p:cNvPr id="27" name="Rectangle 26">
+            <a:extLst>
+              <a:ext uri="{FF2B5EF4-FFF2-40B4-BE49-F238E27FC236}">
+                <a16:creationId xmlns:a16="http://schemas.microsoft.com/office/drawing/2014/main" id="{45CC6500-4DBD-4C34-BC14-2387FB483BEB}"/>
+              </a:ext>
+              <a:ext uri="{C183D7F6-B498-43B3-948B-1728B52AA6E4}">
+                <adec:decorative xmlns:adec="http://schemas.microsoft.com/office/drawing/2017/decorative" val="1"/>
+              </a:ext>
+            </a:extLst>
+          </p:cNvPr>
+          <p:cNvSpPr>
+            <a:spLocks noGrp="1" noRot="1" noChangeAspect="1" noMove="1" noResize="1" noEditPoints="1" noAdjustHandles="1" noChangeArrowheads="1" noChangeShapeType="1" noTextEdit="1"/>
+          </p:cNvSpPr>
+          <p:nvPr>
+            <p:extLst>
+              <p:ext uri="{386F3935-93C4-4BCD-93E2-E3B085C9AB24}">
+                <p16:designElem xmlns:p16="http://schemas.microsoft.com/office/powerpoint/2015/main" val="1"/>
+              </p:ext>
+            </p:extLst>
+          </p:nvPr>
+        </p:nvSpPr>
+        <p:spPr>
+          <a:xfrm>
+            <a:off x="1" y="761999"/>
+            <a:ext cx="4642228" cy="5334001"/>
+          </a:xfrm>
+          <a:prstGeom prst="rect">
+            <a:avLst/>
+          </a:prstGeom>
+          <a:solidFill>
+            <a:schemeClr val="accent1"/>
+          </a:solidFill>
+          <a:ln>
+            <a:noFill/>
+          </a:ln>
+        </p:spPr>
+        <p:style>
+          <a:lnRef idx="2">
+            <a:schemeClr val="accent1">
+              <a:shade val="50000"/>
+            </a:schemeClr>
+          </a:lnRef>
+          <a:fillRef idx="1">
+            <a:schemeClr val="accent1"/>
+          </a:fillRef>
+          <a:effectRef idx="0">
+            <a:schemeClr val="accent1"/>
+          </a:effectRef>
+          <a:fontRef idx="minor">
+            <a:schemeClr val="lt1"/>
+          </a:fontRef>
+        </p:style>
+      </p:sp>
+      <p:sp>
+        <p:nvSpPr>
+          <p:cNvPr id="2" name="Title 1">
+            <a:extLst>
+              <a:ext uri="{FF2B5EF4-FFF2-40B4-BE49-F238E27FC236}">
+                <a16:creationId xmlns:a16="http://schemas.microsoft.com/office/drawing/2014/main" id="{2135BBC7-B59A-6D41-8796-3BC756EB830B}"/>
+              </a:ext>
+            </a:extLst>
+          </p:cNvPr>
+          <p:cNvSpPr>
+            <a:spLocks noGrp="1"/>
+          </p:cNvSpPr>
+          <p:nvPr>
+            <p:ph type="title"/>
+          </p:nvPr>
+        </p:nvSpPr>
+        <p:spPr>
+          <a:xfrm>
+            <a:off x="1069849" y="1298448"/>
+            <a:ext cx="3258688" cy="3255264"/>
+          </a:xfrm>
+        </p:spPr>
+        <p:txBody>
+          <a:bodyPr vert="horz" lIns="91440" tIns="45720" rIns="91440" bIns="45720" rtlCol="0" anchor="b">
+            <a:normAutofit/>
+          </a:bodyPr>
+          <a:lstStyle/>
+          <a:p>
+            <a:r>
+              <a:rPr lang="en-US" sz="4600" b="1" spc="-100"/>
+              <a:t>TOTAL CRIME AVG. PER CAPITA IN CITIES</a:t>
+            </a:r>
+            <a:endParaRPr lang="en-US" sz="4600" spc="-100"/>
+          </a:p>
+        </p:txBody>
+      </p:sp>
+      <p:pic>
+        <p:nvPicPr>
+          <p:cNvPr id="6" name="Picture 5" descr="A screenshot of a cell phone&#10;&#10;Description automatically generated">
+            <a:extLst>
+              <a:ext uri="{FF2B5EF4-FFF2-40B4-BE49-F238E27FC236}">
+                <a16:creationId xmlns:a16="http://schemas.microsoft.com/office/drawing/2014/main" id="{C8E75981-7D8B-4417-A135-99A20D140610}"/>
+              </a:ext>
+            </a:extLst>
+          </p:cNvPr>
+          <p:cNvPicPr>
+            <a:picLocks noChangeAspect="1"/>
+          </p:cNvPicPr>
+          <p:nvPr/>
+        </p:nvPicPr>
+        <p:blipFill rotWithShape="1">
+          <a:blip r:embed="rId2"/>
+          <a:srcRect l="6907" t="7287" r="9318" b="5891"/>
+          <a:stretch/>
+        </p:blipFill>
+        <p:spPr>
+          <a:xfrm>
+            <a:off x="4684761" y="1318342"/>
+            <a:ext cx="7044991" cy="4380711"/>
+          </a:xfrm>
+          <a:prstGeom prst="rect">
+            <a:avLst/>
+          </a:prstGeom>
+        </p:spPr>
+      </p:pic>
+      <p:sp>
+        <p:nvSpPr>
+          <p:cNvPr id="29" name="Rectangle 28">
+            <a:extLst>
+              <a:ext uri="{FF2B5EF4-FFF2-40B4-BE49-F238E27FC236}">
+                <a16:creationId xmlns:a16="http://schemas.microsoft.com/office/drawing/2014/main" id="{4E34A3B6-BAD2-4156-BDC6-4736248BFDE0}"/>
+              </a:ext>
+              <a:ext uri="{C183D7F6-B498-43B3-948B-1728B52AA6E4}">
+                <adec:decorative xmlns:adec="http://schemas.microsoft.com/office/drawing/2017/decorative" val="1"/>
+              </a:ext>
+            </a:extLst>
+          </p:cNvPr>
+          <p:cNvSpPr>
+            <a:spLocks noGrp="1" noRot="1" noChangeAspect="1" noMove="1" noResize="1" noEditPoints="1" noAdjustHandles="1" noChangeArrowheads="1" noChangeShapeType="1" noTextEdit="1"/>
+          </p:cNvSpPr>
+          <p:nvPr>
+            <p:extLst>
+              <p:ext uri="{386F3935-93C4-4BCD-93E2-E3B085C9AB24}">
+                <p16:designElem xmlns:p16="http://schemas.microsoft.com/office/powerpoint/2015/main" val="1"/>
+              </p:ext>
+            </p:extLst>
+          </p:nvPr>
+        </p:nvSpPr>
+        <p:spPr>
+          <a:xfrm>
+            <a:off x="11815864" y="758952"/>
+            <a:ext cx="384048" cy="5330952"/>
           </a:xfrm>
           <a:prstGeom prst="rect">
             <a:avLst/>
@@ -14162,104 +14685,6 @@
           </a:fontRef>
         </p:style>
       </p:sp>
-      <p:sp>
-        <p:nvSpPr>
-          <p:cNvPr id="16" name="Rectangle 15">
-            <a:extLst>
-              <a:ext uri="{FF2B5EF4-FFF2-40B4-BE49-F238E27FC236}">
-                <a16:creationId xmlns:a16="http://schemas.microsoft.com/office/drawing/2014/main" id="{3FE91770-CDBB-4D24-94E5-AD484F36CE87}"/>
-              </a:ext>
-              <a:ext uri="{C183D7F6-B498-43B3-948B-1728B52AA6E4}">
-                <adec:decorative xmlns:adec="http://schemas.microsoft.com/office/drawing/2017/decorative" val="1"/>
-              </a:ext>
-            </a:extLst>
-          </p:cNvPr>
-          <p:cNvSpPr>
-            <a:spLocks noGrp="1" noRot="1" noChangeAspect="1" noMove="1" noResize="1" noEditPoints="1" noAdjustHandles="1" noChangeArrowheads="1" noChangeShapeType="1" noTextEdit="1"/>
-          </p:cNvSpPr>
-          <p:nvPr>
-            <p:extLst>
-              <p:ext uri="{386F3935-93C4-4BCD-93E2-E3B085C9AB24}">
-                <p16:designElem xmlns:p16="http://schemas.microsoft.com/office/powerpoint/2015/main" val="1"/>
-              </p:ext>
-            </p:extLst>
-          </p:nvPr>
-        </p:nvSpPr>
-        <p:spPr>
-          <a:xfrm>
-            <a:off x="1279019" y="2526526"/>
-            <a:ext cx="10920893" cy="3563377"/>
-          </a:xfrm>
-          <a:prstGeom prst="rect">
-            <a:avLst/>
-          </a:prstGeom>
-          <a:solidFill>
-            <a:schemeClr val="bg2">
-              <a:lumMod val="60000"/>
-              <a:lumOff val="40000"/>
-              <a:alpha val="60000"/>
-            </a:schemeClr>
-          </a:solidFill>
-          <a:ln>
-            <a:noFill/>
-          </a:ln>
-        </p:spPr>
-        <p:style>
-          <a:lnRef idx="2">
-            <a:schemeClr val="accent1">
-              <a:shade val="50000"/>
-            </a:schemeClr>
-          </a:lnRef>
-          <a:fillRef idx="1">
-            <a:schemeClr val="accent1"/>
-          </a:fillRef>
-          <a:effectRef idx="0">
-            <a:schemeClr val="accent1"/>
-          </a:effectRef>
-          <a:fontRef idx="minor">
-            <a:schemeClr val="lt1"/>
-          </a:fontRef>
-        </p:style>
-        <p:txBody>
-          <a:bodyPr/>
-          <a:lstStyle/>
-          <a:p>
-            <a:endParaRPr lang="en-US" dirty="0"/>
-          </a:p>
-        </p:txBody>
-      </p:sp>
-      <p:pic>
-        <p:nvPicPr>
-          <p:cNvPr id="9" name="Content Placeholder 8" descr="A screenshot of a cell phone&#10;&#10;Description automatically generated">
-            <a:extLst>
-              <a:ext uri="{FF2B5EF4-FFF2-40B4-BE49-F238E27FC236}">
-                <a16:creationId xmlns:a16="http://schemas.microsoft.com/office/drawing/2014/main" id="{C5B7CDC7-315C-B84F-A28C-0DA02EA56268}"/>
-              </a:ext>
-            </a:extLst>
-          </p:cNvPr>
-          <p:cNvPicPr>
-            <a:picLocks noGrp="1" noChangeAspect="1"/>
-          </p:cNvPicPr>
-          <p:nvPr>
-            <p:ph idx="1"/>
-          </p:nvPr>
-        </p:nvPicPr>
-        <p:blipFill>
-          <a:blip r:embed="rId2"/>
-          <a:stretch>
-            <a:fillRect/>
-          </a:stretch>
-        </p:blipFill>
-        <p:spPr>
-          <a:xfrm>
-            <a:off x="3333690" y="2535238"/>
-            <a:ext cx="5516682" cy="3554412"/>
-          </a:xfrm>
-          <a:prstGeom prst="rect">
-            <a:avLst/>
-          </a:prstGeom>
-        </p:spPr>
-      </p:pic>
     </p:spTree>
     <p:extLst>
       <p:ext uri="{BB962C8B-B14F-4D97-AF65-F5344CB8AC3E}">
@@ -14606,16 +15031,15 @@
           </p:cNvPicPr>
           <p:nvPr/>
         </p:nvPicPr>
-        <p:blipFill>
+        <p:blipFill rotWithShape="1">
           <a:blip r:embed="rId5"/>
-          <a:stretch>
-            <a:fillRect/>
-          </a:stretch>
+          <a:srcRect l="5765" t="7270" r="8084" b="5949"/>
+          <a:stretch/>
         </p:blipFill>
         <p:spPr>
           <a:xfrm>
-            <a:off x="384048" y="856737"/>
-            <a:ext cx="7355633" cy="4741630"/>
+            <a:off x="384048" y="1031357"/>
+            <a:ext cx="7466859" cy="4848447"/>
           </a:xfrm>
           <a:prstGeom prst="rect">
             <a:avLst/>

</xml_diff>

<commit_message>
Updated images in the presentation - scatter diagrams
</commit_message>
<xml_diff>
--- a/Presentation/final draft.pptx
+++ b/Presentation/final draft.pptx
@@ -5,7 +5,7 @@
     <p:sldMasterId id="2147484040" r:id="rId1"/>
   </p:sldMasterIdLst>
   <p:notesMasterIdLst>
-    <p:notesMasterId r:id="rId20"/>
+    <p:notesMasterId r:id="rId21"/>
   </p:notesMasterIdLst>
   <p:sldIdLst>
     <p:sldId id="256" r:id="rId2"/>
@@ -23,9 +23,10 @@
     <p:sldId id="2445" r:id="rId14"/>
     <p:sldId id="2446" r:id="rId15"/>
     <p:sldId id="264" r:id="rId16"/>
-    <p:sldId id="2444" r:id="rId17"/>
-    <p:sldId id="267" r:id="rId18"/>
-    <p:sldId id="2441" r:id="rId19"/>
+    <p:sldId id="2448" r:id="rId17"/>
+    <p:sldId id="2449" r:id="rId18"/>
+    <p:sldId id="267" r:id="rId19"/>
+    <p:sldId id="2441" r:id="rId20"/>
   </p:sldIdLst>
   <p:sldSz cx="12192000" cy="6858000"/>
   <p:notesSz cx="6858000" cy="9144000"/>
@@ -3732,15 +3733,34 @@
           <a:bodyPr/>
           <a:lstStyle/>
           <a:p>
+            <a:pPr marL="0" marR="0" lvl="0" indent="0" algn="l" defTabSz="914400" rtl="0" eaLnBrk="1" fontAlgn="auto" latinLnBrk="0" hangingPunct="1">
+              <a:lnSpc>
+                <a:spcPct val="100000"/>
+              </a:lnSpc>
+              <a:spcBef>
+                <a:spcPts val="0"/>
+              </a:spcBef>
+              <a:spcAft>
+                <a:spcPts val="0"/>
+              </a:spcAft>
+              <a:buClrTx/>
+              <a:buSzTx/>
+              <a:buFontTx/>
+              <a:buNone/>
+              <a:tabLst/>
+              <a:defRPr/>
+            </a:pPr>
+            <a:r>
+              <a:rPr lang="en-US" dirty="0">
+                <a:solidFill>
+                  <a:schemeClr val="bg1"/>
+                </a:solidFill>
+              </a:rPr>
+              <a:t>This graph shows a steady increase of house values from 2012  through 2018, and housing crisis in 2012. </a:t>
+            </a:r>
             <a:r>
               <a:rPr lang="en-US" dirty="0"/>
-              <a:t>For our analysis we want to exploit the variation in crime that occurs within cities from 2012-2018. </a:t>
-            </a:r>
-          </a:p>
-          <a:p>
-            <a:r>
-              <a:rPr lang="en-US" dirty="0"/>
-              <a:t>The proportion of crime in the area has a negative impact on the price. If the proportion of crime increases by one percentage point, prices are expected to drop by 1.5%.</a:t>
+              <a:t> </a:t>
             </a:r>
           </a:p>
           <a:p>
@@ -3765,7 +3785,7 @@
           <a:p>
             <a:fld id="{9A9FD09C-8CDE-EC44-8006-13D124DBA38F}" type="slidenum">
               <a:rPr lang="en-US" smtClean="0"/>
-              <a:t>11</a:t>
+              <a:t>10</a:t>
             </a:fld>
             <a:endParaRPr lang="en-US"/>
           </a:p>
@@ -3774,7 +3794,7 @@
     </p:spTree>
     <p:extLst>
       <p:ext uri="{BB962C8B-B14F-4D97-AF65-F5344CB8AC3E}">
-        <p14:creationId xmlns:p14="http://schemas.microsoft.com/office/powerpoint/2010/main" val="3924546364"/>
+        <p14:creationId xmlns:p14="http://schemas.microsoft.com/office/powerpoint/2010/main" val="565390749"/>
       </p:ext>
     </p:extLst>
   </p:cSld>
@@ -3861,7 +3881,7 @@
           <a:p>
             <a:fld id="{9A9FD09C-8CDE-EC44-8006-13D124DBA38F}" type="slidenum">
               <a:rPr lang="en-US" smtClean="0"/>
-              <a:t>12</a:t>
+              <a:t>11</a:t>
             </a:fld>
             <a:endParaRPr lang="en-US"/>
           </a:p>
@@ -3870,7 +3890,7 @@
     </p:spTree>
     <p:extLst>
       <p:ext uri="{BB962C8B-B14F-4D97-AF65-F5344CB8AC3E}">
-        <p14:creationId xmlns:p14="http://schemas.microsoft.com/office/powerpoint/2010/main" val="4244874762"/>
+        <p14:creationId xmlns:p14="http://schemas.microsoft.com/office/powerpoint/2010/main" val="3924546364"/>
       </p:ext>
     </p:extLst>
   </p:cSld>
@@ -3924,51 +3944,15 @@
           <a:bodyPr/>
           <a:lstStyle/>
           <a:p>
-            <a:pPr algn="ctr"/>
             <a:r>
               <a:rPr lang="en-US" dirty="0"/>
-              <a:t>The graph on the left shows the relationship between Crime rate and Property Value. </a:t>
+              <a:t>For our analysis we want to exploit the variation in crime that occurs within cities from 2012-2018. </a:t>
             </a:r>
           </a:p>
           <a:p>
-            <a:pPr algn="ctr"/>
             <a:r>
               <a:rPr lang="en-US" dirty="0"/>
-              <a:t>The above chart shows the probability of the crime rate in the housing market between the cities from 2012-2018.</a:t>
-            </a:r>
-          </a:p>
-          <a:p>
-            <a:pPr algn="ctr"/>
-            <a:r>
-              <a:rPr lang="en-US" dirty="0"/>
-              <a:t>To do this we combine Information from the </a:t>
-            </a:r>
-            <a:r>
-              <a:rPr lang="en-US" u="sng" dirty="0"/>
-              <a:t>Redfin Housing Data </a:t>
-            </a:r>
-            <a:r>
-              <a:rPr lang="en-US" dirty="0"/>
-              <a:t>with a dataset from </a:t>
-            </a:r>
-          </a:p>
-          <a:p>
-            <a:pPr algn="ctr"/>
-            <a:r>
-              <a:rPr lang="en-US" dirty="0">
-                <a:hlinkClick r:id="rId3">
-                  <a:extLst>
-                    <a:ext uri="{A12FA001-AC4F-418D-AE19-62706E023703}">
-                      <ahyp:hlinkClr xmlns:ahyp="http://schemas.microsoft.com/office/drawing/2018/hyperlinkcolor" val="tx"/>
-                    </a:ext>
-                  </a:extLst>
-                </a:hlinkClick>
-              </a:rPr>
-              <a:t>UCR Publications | Federal Bureau of Investigation</a:t>
-            </a:r>
-            <a:r>
-              <a:rPr lang="en-US" dirty="0"/>
-              <a:t> to produce measure of crime changes between 2012-2018. </a:t>
+              <a:t>The proportion of crime in the area has a negative impact on the price. If the proportion of crime increases by one percentage point, prices are expected to drop by 1.5%.</a:t>
             </a:r>
           </a:p>
           <a:p>
@@ -3993,7 +3977,7 @@
           <a:p>
             <a:fld id="{9A9FD09C-8CDE-EC44-8006-13D124DBA38F}" type="slidenum">
               <a:rPr lang="en-US" smtClean="0"/>
-              <a:t>13</a:t>
+              <a:t>12</a:t>
             </a:fld>
             <a:endParaRPr lang="en-US"/>
           </a:p>
@@ -4002,7 +3986,7 @@
     </p:spTree>
     <p:extLst>
       <p:ext uri="{BB962C8B-B14F-4D97-AF65-F5344CB8AC3E}">
-        <p14:creationId xmlns:p14="http://schemas.microsoft.com/office/powerpoint/2010/main" val="373410724"/>
+        <p14:creationId xmlns:p14="http://schemas.microsoft.com/office/powerpoint/2010/main" val="4244874762"/>
       </p:ext>
     </p:extLst>
   </p:cSld>
@@ -4125,7 +4109,7 @@
           <a:p>
             <a:fld id="{9A9FD09C-8CDE-EC44-8006-13D124DBA38F}" type="slidenum">
               <a:rPr lang="en-US" smtClean="0"/>
-              <a:t>14</a:t>
+              <a:t>13</a:t>
             </a:fld>
             <a:endParaRPr lang="en-US"/>
           </a:p>
@@ -4134,7 +4118,7 @@
     </p:spTree>
     <p:extLst>
       <p:ext uri="{BB962C8B-B14F-4D97-AF65-F5344CB8AC3E}">
-        <p14:creationId xmlns:p14="http://schemas.microsoft.com/office/powerpoint/2010/main" val="3909984046"/>
+        <p14:creationId xmlns:p14="http://schemas.microsoft.com/office/powerpoint/2010/main" val="373410724"/>
       </p:ext>
     </p:extLst>
   </p:cSld>
@@ -4257,7 +4241,7 @@
           <a:p>
             <a:fld id="{9A9FD09C-8CDE-EC44-8006-13D124DBA38F}" type="slidenum">
               <a:rPr lang="en-US" smtClean="0"/>
-              <a:t>15</a:t>
+              <a:t>14</a:t>
             </a:fld>
             <a:endParaRPr lang="en-US"/>
           </a:p>
@@ -4266,7 +4250,7 @@
     </p:spTree>
     <p:extLst>
       <p:ext uri="{BB962C8B-B14F-4D97-AF65-F5344CB8AC3E}">
-        <p14:creationId xmlns:p14="http://schemas.microsoft.com/office/powerpoint/2010/main" val="1483577430"/>
+        <p14:creationId xmlns:p14="http://schemas.microsoft.com/office/powerpoint/2010/main" val="3909984046"/>
       </p:ext>
     </p:extLst>
   </p:cSld>
@@ -4320,14 +4304,51 @@
           <a:bodyPr/>
           <a:lstStyle/>
           <a:p>
-            <a:pPr>
-              <a:spcAft>
-                <a:spcPts val="600"/>
-              </a:spcAft>
-            </a:pPr>
+            <a:pPr algn="ctr"/>
             <a:r>
-              <a:rPr lang="en-US" sz="1200" dirty="0"/>
-              <a:t>Crime concentrations are found in the metropolitan area. </a:t>
+              <a:rPr lang="en-US" dirty="0"/>
+              <a:t>The graph on the left shows the relationship between Crime rate and Property Value. </a:t>
+            </a:r>
+          </a:p>
+          <a:p>
+            <a:pPr algn="ctr"/>
+            <a:r>
+              <a:rPr lang="en-US" dirty="0"/>
+              <a:t>The above chart shows the probability of the crime rate in the housing market between the cities from 2012-2018.</a:t>
+            </a:r>
+          </a:p>
+          <a:p>
+            <a:pPr algn="ctr"/>
+            <a:r>
+              <a:rPr lang="en-US" dirty="0"/>
+              <a:t>To do this we combine Information from the </a:t>
+            </a:r>
+            <a:r>
+              <a:rPr lang="en-US" u="sng" dirty="0"/>
+              <a:t>Redfin Housing Data </a:t>
+            </a:r>
+            <a:r>
+              <a:rPr lang="en-US" dirty="0"/>
+              <a:t>with a dataset from </a:t>
+            </a:r>
+          </a:p>
+          <a:p>
+            <a:pPr algn="ctr"/>
+            <a:r>
+              <a:rPr lang="en-US" dirty="0">
+                <a:hlinkClick r:id="rId3">
+                  <a:extLst>
+                    <a:ext uri="{A12FA001-AC4F-418D-AE19-62706E023703}">
+                      <ahyp:hlinkClr xmlns:ahyp="http://schemas.microsoft.com/office/drawing/2018/hyperlinkcolor" val="tx"/>
+                    </a:ext>
+                  </a:extLst>
+                </a:hlinkClick>
+              </a:rPr>
+              <a:t>UCR Publications | Federal Bureau of Investigation</a:t>
+            </a:r>
+            <a:r>
+              <a:rPr lang="en-US" dirty="0"/>
+              <a:t> to produce measure of crime changes between 2012-2018. </a:t>
             </a:r>
           </a:p>
           <a:p>
@@ -4352,7 +4373,7 @@
           <a:p>
             <a:fld id="{9A9FD09C-8CDE-EC44-8006-13D124DBA38F}" type="slidenum">
               <a:rPr lang="en-US" smtClean="0"/>
-              <a:t>17</a:t>
+              <a:t>15</a:t>
             </a:fld>
             <a:endParaRPr lang="en-US"/>
           </a:p>
@@ -4361,7 +4382,7 @@
     </p:spTree>
     <p:extLst>
       <p:ext uri="{BB962C8B-B14F-4D97-AF65-F5344CB8AC3E}">
-        <p14:creationId xmlns:p14="http://schemas.microsoft.com/office/powerpoint/2010/main" val="3749441230"/>
+        <p14:creationId xmlns:p14="http://schemas.microsoft.com/office/powerpoint/2010/main" val="1483577430"/>
       </p:ext>
     </p:extLst>
   </p:cSld>
@@ -4436,7 +4457,186 @@
           <a:p>
             <a:fld id="{9A9FD09C-8CDE-EC44-8006-13D124DBA38F}" type="slidenum">
               <a:rPr lang="en-US" smtClean="0"/>
+              <a:t>17</a:t>
+            </a:fld>
+            <a:endParaRPr lang="en-US"/>
+          </a:p>
+        </p:txBody>
+      </p:sp>
+    </p:spTree>
+    <p:extLst>
+      <p:ext uri="{BB962C8B-B14F-4D97-AF65-F5344CB8AC3E}">
+        <p14:creationId xmlns:p14="http://schemas.microsoft.com/office/powerpoint/2010/main" val="2777848899"/>
+      </p:ext>
+    </p:extLst>
+  </p:cSld>
+  <p:clrMapOvr>
+    <a:masterClrMapping/>
+  </p:clrMapOvr>
+</p:notes>
+</file>
+
+<file path=ppt/notesSlides/notesSlide17.xml><?xml version="1.0" encoding="utf-8"?>
+<p:notes xmlns:a="http://schemas.openxmlformats.org/drawingml/2006/main" xmlns:r="http://schemas.openxmlformats.org/officeDocument/2006/relationships" xmlns:p="http://schemas.openxmlformats.org/presentationml/2006/main">
+  <p:cSld>
+    <p:spTree>
+      <p:nvGrpSpPr>
+        <p:cNvPr id="1" name=""/>
+        <p:cNvGrpSpPr/>
+        <p:nvPr/>
+      </p:nvGrpSpPr>
+      <p:grpSpPr>
+        <a:xfrm>
+          <a:off x="0" y="0"/>
+          <a:ext cx="0" cy="0"/>
+          <a:chOff x="0" y="0"/>
+          <a:chExt cx="0" cy="0"/>
+        </a:xfrm>
+      </p:grpSpPr>
+      <p:sp>
+        <p:nvSpPr>
+          <p:cNvPr id="2" name="Slide Image Placeholder 1"/>
+          <p:cNvSpPr>
+            <a:spLocks noGrp="1" noRot="1" noChangeAspect="1"/>
+          </p:cNvSpPr>
+          <p:nvPr>
+            <p:ph type="sldImg"/>
+          </p:nvPr>
+        </p:nvSpPr>
+        <p:spPr/>
+      </p:sp>
+      <p:sp>
+        <p:nvSpPr>
+          <p:cNvPr id="3" name="Notes Placeholder 2"/>
+          <p:cNvSpPr>
+            <a:spLocks noGrp="1"/>
+          </p:cNvSpPr>
+          <p:nvPr>
+            <p:ph type="body" idx="1"/>
+          </p:nvPr>
+        </p:nvSpPr>
+        <p:spPr/>
+        <p:txBody>
+          <a:bodyPr/>
+          <a:lstStyle/>
+          <a:p>
+            <a:pPr>
+              <a:spcAft>
+                <a:spcPts val="600"/>
+              </a:spcAft>
+            </a:pPr>
+            <a:r>
+              <a:rPr lang="en-US" sz="1200" dirty="0"/>
+              <a:t>Crime concentrations are found in the metropolitan area. </a:t>
+            </a:r>
+          </a:p>
+          <a:p>
+            <a:endParaRPr lang="en-US" dirty="0"/>
+          </a:p>
+        </p:txBody>
+      </p:sp>
+      <p:sp>
+        <p:nvSpPr>
+          <p:cNvPr id="4" name="Slide Number Placeholder 3"/>
+          <p:cNvSpPr>
+            <a:spLocks noGrp="1"/>
+          </p:cNvSpPr>
+          <p:nvPr>
+            <p:ph type="sldNum" sz="quarter" idx="5"/>
+          </p:nvPr>
+        </p:nvSpPr>
+        <p:spPr/>
+        <p:txBody>
+          <a:bodyPr/>
+          <a:lstStyle/>
+          <a:p>
+            <a:fld id="{9A9FD09C-8CDE-EC44-8006-13D124DBA38F}" type="slidenum">
+              <a:rPr lang="en-US" smtClean="0"/>
               <a:t>18</a:t>
+            </a:fld>
+            <a:endParaRPr lang="en-US"/>
+          </a:p>
+        </p:txBody>
+      </p:sp>
+    </p:spTree>
+    <p:extLst>
+      <p:ext uri="{BB962C8B-B14F-4D97-AF65-F5344CB8AC3E}">
+        <p14:creationId xmlns:p14="http://schemas.microsoft.com/office/powerpoint/2010/main" val="3749441230"/>
+      </p:ext>
+    </p:extLst>
+  </p:cSld>
+  <p:clrMapOvr>
+    <a:masterClrMapping/>
+  </p:clrMapOvr>
+</p:notes>
+</file>
+
+<file path=ppt/notesSlides/notesSlide18.xml><?xml version="1.0" encoding="utf-8"?>
+<p:notes xmlns:a="http://schemas.openxmlformats.org/drawingml/2006/main" xmlns:r="http://schemas.openxmlformats.org/officeDocument/2006/relationships" xmlns:p="http://schemas.openxmlformats.org/presentationml/2006/main">
+  <p:cSld>
+    <p:spTree>
+      <p:nvGrpSpPr>
+        <p:cNvPr id="1" name=""/>
+        <p:cNvGrpSpPr/>
+        <p:nvPr/>
+      </p:nvGrpSpPr>
+      <p:grpSpPr>
+        <a:xfrm>
+          <a:off x="0" y="0"/>
+          <a:ext cx="0" cy="0"/>
+          <a:chOff x="0" y="0"/>
+          <a:chExt cx="0" cy="0"/>
+        </a:xfrm>
+      </p:grpSpPr>
+      <p:sp>
+        <p:nvSpPr>
+          <p:cNvPr id="2" name="Slide Image Placeholder 1"/>
+          <p:cNvSpPr>
+            <a:spLocks noGrp="1" noRot="1" noChangeAspect="1"/>
+          </p:cNvSpPr>
+          <p:nvPr>
+            <p:ph type="sldImg"/>
+          </p:nvPr>
+        </p:nvSpPr>
+        <p:spPr/>
+      </p:sp>
+      <p:sp>
+        <p:nvSpPr>
+          <p:cNvPr id="3" name="Notes Placeholder 2"/>
+          <p:cNvSpPr>
+            <a:spLocks noGrp="1"/>
+          </p:cNvSpPr>
+          <p:nvPr>
+            <p:ph type="body" idx="1"/>
+          </p:nvPr>
+        </p:nvSpPr>
+        <p:spPr/>
+        <p:txBody>
+          <a:bodyPr/>
+          <a:lstStyle/>
+          <a:p>
+            <a:endParaRPr lang="en-US" dirty="0"/>
+          </a:p>
+        </p:txBody>
+      </p:sp>
+      <p:sp>
+        <p:nvSpPr>
+          <p:cNvPr id="4" name="Slide Number Placeholder 3"/>
+          <p:cNvSpPr>
+            <a:spLocks noGrp="1"/>
+          </p:cNvSpPr>
+          <p:nvPr>
+            <p:ph type="sldNum" sz="quarter" idx="5"/>
+          </p:nvPr>
+        </p:nvSpPr>
+        <p:spPr/>
+        <p:txBody>
+          <a:bodyPr/>
+          <a:lstStyle/>
+          <a:p>
+            <a:fld id="{9A9FD09C-8CDE-EC44-8006-13D124DBA38F}" type="slidenum">
+              <a:rPr lang="en-US" smtClean="0"/>
+              <a:t>19</a:t>
             </a:fld>
             <a:endParaRPr lang="en-US"/>
           </a:p>
@@ -5180,37 +5380,6 @@
           <a:bodyPr/>
           <a:lstStyle/>
           <a:p>
-            <a:pPr marL="0" marR="0" lvl="0" indent="0" algn="l" defTabSz="914400" rtl="0" eaLnBrk="1" fontAlgn="auto" latinLnBrk="0" hangingPunct="1">
-              <a:lnSpc>
-                <a:spcPct val="100000"/>
-              </a:lnSpc>
-              <a:spcBef>
-                <a:spcPts val="0"/>
-              </a:spcBef>
-              <a:spcAft>
-                <a:spcPts val="0"/>
-              </a:spcAft>
-              <a:buClrTx/>
-              <a:buSzTx/>
-              <a:buFontTx/>
-              <a:buNone/>
-              <a:tabLst/>
-              <a:defRPr/>
-            </a:pPr>
-            <a:r>
-              <a:rPr lang="en-US" dirty="0">
-                <a:solidFill>
-                  <a:schemeClr val="bg1"/>
-                </a:solidFill>
-              </a:rPr>
-              <a:t>This graph shows a steady increase of house values from 2012  through 2018, and housing crisis in 2012. </a:t>
-            </a:r>
-            <a:r>
-              <a:rPr lang="en-US" dirty="0"/>
-              <a:t> </a:t>
-            </a:r>
-          </a:p>
-          <a:p>
             <a:endParaRPr lang="en-US" dirty="0"/>
           </a:p>
         </p:txBody>
@@ -5232,7 +5401,7 @@
           <a:p>
             <a:fld id="{9A9FD09C-8CDE-EC44-8006-13D124DBA38F}" type="slidenum">
               <a:rPr lang="en-US" smtClean="0"/>
-              <a:t>10</a:t>
+              <a:t>9</a:t>
             </a:fld>
             <a:endParaRPr lang="en-US"/>
           </a:p>
@@ -5241,7 +5410,7 @@
     </p:spTree>
     <p:extLst>
       <p:ext uri="{BB962C8B-B14F-4D97-AF65-F5344CB8AC3E}">
-        <p14:creationId xmlns:p14="http://schemas.microsoft.com/office/powerpoint/2010/main" val="565390749"/>
+        <p14:creationId xmlns:p14="http://schemas.microsoft.com/office/powerpoint/2010/main" val="3548334798"/>
       </p:ext>
     </p:extLst>
   </p:cSld>
@@ -10752,8 +10921,8 @@
         </p:blipFill>
         <p:spPr>
           <a:xfrm>
-            <a:off x="3588221" y="956135"/>
-            <a:ext cx="8227643" cy="4936586"/>
+            <a:off x="3630723" y="956135"/>
+            <a:ext cx="8174508" cy="4936586"/>
           </a:xfrm>
           <a:prstGeom prst="rect">
             <a:avLst/>
@@ -10939,7 +11108,7 @@
           </a:xfrm>
         </p:spPr>
         <p:txBody>
-          <a:bodyPr vert="horz" lIns="91440" tIns="45720" rIns="91440" bIns="45720" rtlCol="0" anchor="t">
+          <a:bodyPr vert="horz" lIns="91440" tIns="45720" rIns="91440" bIns="45720" rtlCol="0" anchor="ctr">
             <a:normAutofit/>
           </a:bodyPr>
           <a:lstStyle/>
@@ -10950,21 +11119,21 @@
               </a:spcAft>
             </a:pPr>
             <a:r>
-              <a:rPr lang="en-US" sz="2800" b="1" cap="all" dirty="0">
+              <a:rPr lang="en-US" b="1" cap="all" dirty="0">
                 <a:latin typeface="Arial" panose="020B0604020202020204" pitchFamily="34" charset="0"/>
                 <a:cs typeface="Arial" panose="020B0604020202020204" pitchFamily="34" charset="0"/>
               </a:rPr>
               <a:t>Days on Market </a:t>
             </a:r>
             <a:r>
-              <a:rPr lang="en-US" sz="2800" b="1" cap="small" dirty="0">
+              <a:rPr lang="en-US" b="1" cap="small" dirty="0">
                 <a:latin typeface="Arial" panose="020B0604020202020204" pitchFamily="34" charset="0"/>
                 <a:cs typeface="Arial" panose="020B0604020202020204" pitchFamily="34" charset="0"/>
               </a:rPr>
               <a:t>vs</a:t>
             </a:r>
             <a:r>
-              <a:rPr lang="en-US" sz="2800" b="1" cap="all" dirty="0">
+              <a:rPr lang="en-US" b="1" cap="all" dirty="0">
                 <a:latin typeface="Arial" panose="020B0604020202020204" pitchFamily="34" charset="0"/>
                 <a:cs typeface="Arial" panose="020B0604020202020204" pitchFamily="34" charset="0"/>
               </a:rPr>
@@ -10973,34 +11142,6 @@
           </a:p>
         </p:txBody>
       </p:sp>
-      <p:pic>
-        <p:nvPicPr>
-          <p:cNvPr id="3" name="Content Placeholder 2" descr="A picture containing food&#10;&#10;Description automatically generated">
-            <a:extLst>
-              <a:ext uri="{FF2B5EF4-FFF2-40B4-BE49-F238E27FC236}">
-                <a16:creationId xmlns:a16="http://schemas.microsoft.com/office/drawing/2014/main" id="{2C5B88E6-18D6-4B2C-B179-440FA889471E}"/>
-              </a:ext>
-            </a:extLst>
-          </p:cNvPr>
-          <p:cNvPicPr>
-            <a:picLocks noGrp="1" noChangeAspect="1"/>
-          </p:cNvPicPr>
-          <p:nvPr>
-            <p:ph sz="half" idx="1"/>
-          </p:nvPr>
-        </p:nvPicPr>
-        <p:blipFill rotWithShape="1">
-          <a:blip r:embed="rId3"/>
-          <a:srcRect l="6404" t="5260" r="8521"/>
-          <a:stretch/>
-        </p:blipFill>
-        <p:spPr>
-          <a:xfrm>
-            <a:off x="3455633" y="841346"/>
-            <a:ext cx="8297138" cy="5331901"/>
-          </a:xfrm>
-        </p:spPr>
-      </p:pic>
       <p:sp>
         <p:nvSpPr>
           <p:cNvPr id="7" name="Rectangle 6">
@@ -11128,6 +11269,75 @@
           </a:fontRef>
         </p:style>
       </p:cxnSp>
+      <p:pic>
+        <p:nvPicPr>
+          <p:cNvPr id="14" name="Picture 13" descr="A picture containing food&#10;&#10;Description automatically generated">
+            <a:extLst>
+              <a:ext uri="{FF2B5EF4-FFF2-40B4-BE49-F238E27FC236}">
+                <a16:creationId xmlns:a16="http://schemas.microsoft.com/office/drawing/2014/main" id="{52B26C1D-6C4E-40E9-9201-5E5A5815E65E}"/>
+              </a:ext>
+            </a:extLst>
+          </p:cNvPr>
+          <p:cNvPicPr>
+            <a:picLocks noChangeAspect="1"/>
+          </p:cNvPicPr>
+          <p:nvPr/>
+        </p:nvPicPr>
+        <p:blipFill>
+          <a:blip r:embed="rId3"/>
+          <a:stretch>
+            <a:fillRect/>
+          </a:stretch>
+        </p:blipFill>
+        <p:spPr>
+          <a:xfrm>
+            <a:off x="3528902" y="1165312"/>
+            <a:ext cx="8197750" cy="4518232"/>
+          </a:xfrm>
+          <a:prstGeom prst="rect">
+            <a:avLst/>
+          </a:prstGeom>
+        </p:spPr>
+      </p:pic>
+      <p:sp>
+        <p:nvSpPr>
+          <p:cNvPr id="16" name="TextBox 15">
+            <a:extLst>
+              <a:ext uri="{FF2B5EF4-FFF2-40B4-BE49-F238E27FC236}">
+                <a16:creationId xmlns:a16="http://schemas.microsoft.com/office/drawing/2014/main" id="{72FDC0AE-D40E-4F83-8832-39E288DA8C1D}"/>
+              </a:ext>
+            </a:extLst>
+          </p:cNvPr>
+          <p:cNvSpPr txBox="1"/>
+          <p:nvPr/>
+        </p:nvSpPr>
+        <p:spPr>
+          <a:xfrm>
+            <a:off x="8172893" y="60596"/>
+            <a:ext cx="3678865" cy="646331"/>
+          </a:xfrm>
+          <a:prstGeom prst="rect">
+            <a:avLst/>
+          </a:prstGeom>
+          <a:noFill/>
+        </p:spPr>
+        <p:txBody>
+          <a:bodyPr wrap="square" rtlCol="0">
+            <a:spAutoFit/>
+          </a:bodyPr>
+          <a:lstStyle/>
+          <a:p>
+            <a:r>
+              <a:rPr lang="en-US" b="1" dirty="0">
+                <a:solidFill>
+                  <a:srgbClr val="FF0000"/>
+                </a:solidFill>
+              </a:rPr>
+              <a:t>Should 10,000 be in the chart title or just in the X axis?  </a:t>
+            </a:r>
+          </a:p>
+        </p:txBody>
+      </p:sp>
     </p:spTree>
     <p:extLst>
       <p:ext uri="{BB962C8B-B14F-4D97-AF65-F5344CB8AC3E}">
@@ -11189,7 +11399,7 @@
           </a:xfrm>
         </p:spPr>
         <p:txBody>
-          <a:bodyPr vert="horz" lIns="91440" tIns="45720" rIns="91440" bIns="45720" rtlCol="0" anchor="t">
+          <a:bodyPr vert="horz" lIns="91440" tIns="45720" rIns="91440" bIns="45720" rtlCol="0" anchor="ctr">
             <a:normAutofit/>
           </a:bodyPr>
           <a:lstStyle/>
@@ -11200,21 +11410,21 @@
               </a:spcAft>
             </a:pPr>
             <a:r>
-              <a:rPr lang="en-US" sz="2800" b="1" cap="all" dirty="0">
+              <a:rPr lang="en-US" b="1" cap="all" dirty="0">
                 <a:latin typeface="Arial" panose="020B0604020202020204" pitchFamily="34" charset="0"/>
                 <a:cs typeface="Arial" panose="020B0604020202020204" pitchFamily="34" charset="0"/>
               </a:rPr>
               <a:t>Sales Price </a:t>
             </a:r>
             <a:r>
-              <a:rPr lang="en-US" sz="2800" b="1" cap="small" dirty="0">
+              <a:rPr lang="en-US" b="1" cap="small" dirty="0">
                 <a:latin typeface="Arial" panose="020B0604020202020204" pitchFamily="34" charset="0"/>
                 <a:cs typeface="Arial" panose="020B0604020202020204" pitchFamily="34" charset="0"/>
               </a:rPr>
               <a:t>vs</a:t>
             </a:r>
             <a:r>
-              <a:rPr lang="en-US" sz="2800" b="1" cap="all" dirty="0">
+              <a:rPr lang="en-US" b="1" cap="all" dirty="0">
                 <a:latin typeface="Arial" panose="020B0604020202020204" pitchFamily="34" charset="0"/>
                 <a:cs typeface="Arial" panose="020B0604020202020204" pitchFamily="34" charset="0"/>
               </a:rPr>
@@ -11307,36 +11517,6 @@
           </a:p>
         </p:txBody>
       </p:sp>
-      <p:pic>
-        <p:nvPicPr>
-          <p:cNvPr id="9" name="Picture 8" descr="A screenshot of a cell phone&#10;&#10;Description automatically generated">
-            <a:extLst>
-              <a:ext uri="{FF2B5EF4-FFF2-40B4-BE49-F238E27FC236}">
-                <a16:creationId xmlns:a16="http://schemas.microsoft.com/office/drawing/2014/main" id="{EBA963C2-D536-4C09-B5FA-9261413ED00B}"/>
-              </a:ext>
-            </a:extLst>
-          </p:cNvPr>
-          <p:cNvPicPr>
-            <a:picLocks noChangeAspect="1"/>
-          </p:cNvPicPr>
-          <p:nvPr/>
-        </p:nvPicPr>
-        <p:blipFill>
-          <a:blip r:embed="rId3"/>
-          <a:stretch>
-            <a:fillRect/>
-          </a:stretch>
-        </p:blipFill>
-        <p:spPr>
-          <a:xfrm>
-            <a:off x="3489692" y="1179112"/>
-            <a:ext cx="8244712" cy="4499565"/>
-          </a:xfrm>
-          <a:prstGeom prst="rect">
-            <a:avLst/>
-          </a:prstGeom>
-        </p:spPr>
-      </p:pic>
       <p:sp>
         <p:nvSpPr>
           <p:cNvPr id="10" name="TextBox 9">
@@ -11351,7 +11531,7 @@
         </p:nvSpPr>
         <p:spPr>
           <a:xfrm>
-            <a:off x="6836735" y="1765005"/>
+            <a:off x="8172893" y="60596"/>
             <a:ext cx="3678865" cy="646331"/>
           </a:xfrm>
           <a:prstGeom prst="rect">
@@ -11371,7 +11551,7 @@
                   <a:srgbClr val="FF0000"/>
                 </a:solidFill>
               </a:rPr>
-              <a:t>Placeholder image – need to update with updated Y axis</a:t>
+              <a:t>Should 10,000 be in the chart title or just in the X axis?  </a:t>
             </a:r>
           </a:p>
         </p:txBody>
@@ -11464,6 +11644,35 @@
           </a:fontRef>
         </p:style>
       </p:cxnSp>
+      <p:pic>
+        <p:nvPicPr>
+          <p:cNvPr id="14" name="Picture 13" descr="A picture containing food&#10;&#10;Description automatically generated">
+            <a:extLst>
+              <a:ext uri="{FF2B5EF4-FFF2-40B4-BE49-F238E27FC236}">
+                <a16:creationId xmlns:a16="http://schemas.microsoft.com/office/drawing/2014/main" id="{BF189124-DDA7-4C61-8A92-D5E596BA5BCA}"/>
+              </a:ext>
+            </a:extLst>
+          </p:cNvPr>
+          <p:cNvPicPr>
+            <a:picLocks noChangeAspect="1"/>
+          </p:cNvPicPr>
+          <p:nvPr/>
+        </p:nvPicPr>
+        <p:blipFill rotWithShape="1">
+          <a:blip r:embed="rId3"/>
+          <a:srcRect l="2165" t="5473" r="8637"/>
+          <a:stretch/>
+        </p:blipFill>
+        <p:spPr>
+          <a:xfrm>
+            <a:off x="3466214" y="1263806"/>
+            <a:ext cx="8155174" cy="4321244"/>
+          </a:xfrm>
+          <a:prstGeom prst="rect">
+            <a:avLst/>
+          </a:prstGeom>
+        </p:spPr>
+      </p:pic>
     </p:spTree>
     <p:extLst>
       <p:ext uri="{BB962C8B-B14F-4D97-AF65-F5344CB8AC3E}">
@@ -11822,10 +12031,10 @@
       </p:sp>
       <p:pic>
         <p:nvPicPr>
-          <p:cNvPr id="24" name="Picture 23" descr="A close up of a piece of paper&#10;&#10;Description automatically generated">
+          <p:cNvPr id="9" name="Picture 8" descr="A close up of a logo&#10;&#10;Description automatically generated">
             <a:extLst>
               <a:ext uri="{FF2B5EF4-FFF2-40B4-BE49-F238E27FC236}">
-                <a16:creationId xmlns:a16="http://schemas.microsoft.com/office/drawing/2014/main" id="{4C051068-247D-47A9-A768-2BA811229743}"/>
+                <a16:creationId xmlns:a16="http://schemas.microsoft.com/office/drawing/2014/main" id="{7A26E5E2-A62B-4F1F-BE6F-8E1CD433C2CF}"/>
               </a:ext>
             </a:extLst>
           </p:cNvPr>
@@ -11836,13 +12045,13 @@
         </p:nvPicPr>
         <p:blipFill rotWithShape="1">
           <a:blip r:embed="rId3"/>
-          <a:srcRect l="5394" t="3085" r="7467" b="-1"/>
+          <a:srcRect l="2675" t="4697" r="8477"/>
           <a:stretch/>
         </p:blipFill>
         <p:spPr>
           <a:xfrm>
-            <a:off x="15555" y="505121"/>
-            <a:ext cx="6050714" cy="3407594"/>
+            <a:off x="121999" y="762000"/>
+            <a:ext cx="5874753" cy="3150782"/>
           </a:xfrm>
           <a:prstGeom prst="rect">
             <a:avLst/>
@@ -11854,10 +12063,10 @@
       </p:pic>
       <p:pic>
         <p:nvPicPr>
-          <p:cNvPr id="26" name="Picture 25" descr="A screenshot of a cell phone&#10;&#10;Description automatically generated">
+          <p:cNvPr id="13" name="Picture 12" descr="A screenshot of a cell phone&#10;&#10;Description automatically generated">
             <a:extLst>
               <a:ext uri="{FF2B5EF4-FFF2-40B4-BE49-F238E27FC236}">
-                <a16:creationId xmlns:a16="http://schemas.microsoft.com/office/drawing/2014/main" id="{147539F5-1660-4D8E-9B27-E167F1C96290}"/>
+                <a16:creationId xmlns:a16="http://schemas.microsoft.com/office/drawing/2014/main" id="{3A7D4B49-71D9-4F06-BEEF-E7DC62836376}"/>
               </a:ext>
             </a:extLst>
           </p:cNvPr>
@@ -11866,15 +12075,16 @@
           </p:cNvPicPr>
           <p:nvPr/>
         </p:nvPicPr>
-        <p:blipFill rotWithShape="1">
+        <p:blipFill>
           <a:blip r:embed="rId4"/>
-          <a:srcRect l="5214" t="4511" r="8372"/>
-          <a:stretch/>
+          <a:stretch>
+            <a:fillRect/>
+          </a:stretch>
         </p:blipFill>
         <p:spPr>
           <a:xfrm>
-            <a:off x="6267205" y="547653"/>
-            <a:ext cx="5859944" cy="3365062"/>
+            <a:off x="6112730" y="759711"/>
+            <a:ext cx="5990259" cy="3150782"/>
           </a:xfrm>
           <a:prstGeom prst="rect">
             <a:avLst/>
@@ -11886,10 +12096,10 @@
       </p:pic>
       <p:sp>
         <p:nvSpPr>
-          <p:cNvPr id="28" name="TextBox 27">
+          <p:cNvPr id="14" name="TextBox 13">
             <a:extLst>
               <a:ext uri="{FF2B5EF4-FFF2-40B4-BE49-F238E27FC236}">
-                <a16:creationId xmlns:a16="http://schemas.microsoft.com/office/drawing/2014/main" id="{91A6E864-378C-48E9-8C9A-670BFAE74B91}"/>
+                <a16:creationId xmlns:a16="http://schemas.microsoft.com/office/drawing/2014/main" id="{EF0AED74-9F70-4F4E-A4F3-55014DE05E77}"/>
               </a:ext>
             </a:extLst>
           </p:cNvPr>
@@ -11898,7 +12108,7 @@
         </p:nvSpPr>
         <p:spPr>
           <a:xfrm>
-            <a:off x="4816549" y="164940"/>
+            <a:off x="8172893" y="60596"/>
             <a:ext cx="3678865" cy="646331"/>
           </a:xfrm>
           <a:prstGeom prst="rect">
@@ -11918,7 +12128,7 @@
                   <a:srgbClr val="FF0000"/>
                 </a:solidFill>
               </a:rPr>
-              <a:t>Placeholder image – need to update with updated chart titles</a:t>
+              <a:t>Should 10,000 be in the chart title or just in the X axis?  </a:t>
             </a:r>
           </a:p>
         </p:txBody>
@@ -11963,10 +12173,10 @@
       </p:grpSpPr>
       <p:sp>
         <p:nvSpPr>
-          <p:cNvPr id="43" name="Rectangle 42">
+          <p:cNvPr id="54" name="Rectangle 53">
             <a:extLst>
               <a:ext uri="{FF2B5EF4-FFF2-40B4-BE49-F238E27FC236}">
-                <a16:creationId xmlns:a16="http://schemas.microsoft.com/office/drawing/2014/main" id="{40DCEEEA-6FE7-4541-9EB2-EF754066EE9B}"/>
+                <a16:creationId xmlns:a16="http://schemas.microsoft.com/office/drawing/2014/main" id="{64C9EE1D-12BB-43F7-9A2A-893578DCA63A}"/>
               </a:ext>
               <a:ext uri="{C183D7F6-B498-43B3-948B-1728B52AA6E4}">
                 <adec:decorative xmlns:adec="http://schemas.microsoft.com/office/drawing/2017/decorative" val="1"/>
@@ -11986,8 +12196,8 @@
         </p:nvSpPr>
         <p:spPr>
           <a:xfrm>
-            <a:off x="1" y="758952"/>
-            <a:ext cx="3443590" cy="5330952"/>
+            <a:off x="0" y="761999"/>
+            <a:ext cx="9141619" cy="5334001"/>
           </a:xfrm>
           <a:prstGeom prst="rect">
             <a:avLst/>
@@ -12018,10 +12228,10 @@
       </p:sp>
       <p:sp>
         <p:nvSpPr>
-          <p:cNvPr id="45" name="Rectangle 44">
+          <p:cNvPr id="56" name="Rectangle 55">
             <a:extLst>
               <a:ext uri="{FF2B5EF4-FFF2-40B4-BE49-F238E27FC236}">
-                <a16:creationId xmlns:a16="http://schemas.microsoft.com/office/drawing/2014/main" id="{03A72D00-0CA4-4A88-86CE-B1FB393C52C2}"/>
+                <a16:creationId xmlns:a16="http://schemas.microsoft.com/office/drawing/2014/main" id="{43962A31-C54E-4762-B155-59777FED1C75}"/>
               </a:ext>
               <a:ext uri="{C183D7F6-B498-43B3-948B-1728B52AA6E4}">
                 <adec:decorative xmlns:adec="http://schemas.microsoft.com/office/drawing/2017/decorative" val="1"/>
@@ -12041,8 +12251,8 @@
         </p:nvSpPr>
         <p:spPr>
           <a:xfrm>
-            <a:off x="11815864" y="758952"/>
-            <a:ext cx="384048" cy="5330952"/>
+            <a:off x="9270263" y="761999"/>
+            <a:ext cx="2925318" cy="5334001"/>
           </a:xfrm>
           <a:prstGeom prst="rect">
             <a:avLst/>
@@ -12075,10 +12285,10 @@
       </p:sp>
       <p:sp useBgFill="1">
         <p:nvSpPr>
-          <p:cNvPr id="47" name="Rectangle 46">
+          <p:cNvPr id="58" name="Rectangle 57">
             <a:extLst>
               <a:ext uri="{FF2B5EF4-FFF2-40B4-BE49-F238E27FC236}">
-                <a16:creationId xmlns:a16="http://schemas.microsoft.com/office/drawing/2014/main" id="{A1DFCBE5-52C1-48A9-89CF-E7D68CCA1620}"/>
+                <a16:creationId xmlns:a16="http://schemas.microsoft.com/office/drawing/2014/main" id="{4B392D36-B685-45E0-B197-6EE5D748093B}"/>
               </a:ext>
               <a:ext uri="{C183D7F6-B498-43B3-948B-1728B52AA6E4}">
                 <adec:decorative xmlns:adec="http://schemas.microsoft.com/office/drawing/2017/decorative" val="1"/>
@@ -12099,7 +12309,7 @@
         <p:spPr>
           <a:xfrm>
             <a:off x="0" y="0"/>
-            <a:ext cx="12188952" cy="6858000"/>
+            <a:ext cx="12191999" cy="6858000"/>
           </a:xfrm>
           <a:prstGeom prst="rect">
             <a:avLst/>
@@ -12135,10 +12345,10 @@
       </p:sp>
       <p:sp>
         <p:nvSpPr>
-          <p:cNvPr id="49" name="Rectangle 48">
+          <p:cNvPr id="60" name="Rectangle 59">
             <a:extLst>
               <a:ext uri="{FF2B5EF4-FFF2-40B4-BE49-F238E27FC236}">
-                <a16:creationId xmlns:a16="http://schemas.microsoft.com/office/drawing/2014/main" id="{EB17C8F6-D357-4254-BBAC-96B01EEBE162}"/>
+                <a16:creationId xmlns:a16="http://schemas.microsoft.com/office/drawing/2014/main" id="{9DCA8533-CC5E-4754-9A04-047EDE49E0F9}"/>
               </a:ext>
               <a:ext uri="{C183D7F6-B498-43B3-948B-1728B52AA6E4}">
                 <adec:decorative xmlns:adec="http://schemas.microsoft.com/office/drawing/2017/decorative" val="1"/>
@@ -12158,8 +12368,8 @@
         </p:nvSpPr>
         <p:spPr>
           <a:xfrm>
-            <a:off x="0" y="3647203"/>
-            <a:ext cx="11707367" cy="2572622"/>
+            <a:off x="0" y="4367639"/>
+            <a:ext cx="11707367" cy="1852186"/>
           </a:xfrm>
           <a:prstGeom prst="rect">
             <a:avLst/>
@@ -12206,27 +12416,26 @@
         </p:nvSpPr>
         <p:spPr>
           <a:xfrm>
-            <a:off x="30647" y="4049486"/>
-            <a:ext cx="11473781" cy="1883228"/>
+            <a:off x="1069848" y="4590661"/>
+            <a:ext cx="10210862" cy="1065690"/>
           </a:xfrm>
         </p:spPr>
         <p:txBody>
-          <a:bodyPr vert="horz" lIns="91440" tIns="45720" rIns="91440" bIns="45720" rtlCol="0" anchor="ctr">
+          <a:bodyPr vert="horz" lIns="91440" tIns="45720" rIns="91440" bIns="45720" rtlCol="0" anchor="b">
             <a:normAutofit/>
           </a:bodyPr>
           <a:lstStyle/>
           <a:p>
-            <a:pPr algn="r"/>
             <a:r>
-              <a:rPr lang="en-US" sz="4400" cap="all" dirty="0"/>
+              <a:rPr lang="en-US" sz="3700" b="1" cap="all" spc="-100" dirty="0"/>
               <a:t>Housing Units Sold by Price </a:t>
             </a:r>
             <a:r>
-              <a:rPr lang="en-US" sz="4400" cap="small" dirty="0"/>
+              <a:rPr lang="en-US" sz="3700" b="1" cap="small" spc="-100" dirty="0"/>
               <a:t>vs</a:t>
             </a:r>
             <a:r>
-              <a:rPr lang="en-US" sz="4400" cap="all" dirty="0"/>
+              <a:rPr lang="en-US" sz="3700" b="1" cap="all" spc="-100" dirty="0"/>
               <a:t> Crime Rate</a:t>
             </a:r>
           </a:p>
@@ -12234,10 +12443,10 @@
       </p:sp>
       <p:pic>
         <p:nvPicPr>
-          <p:cNvPr id="18" name="Picture 17" descr="A close up of a map&#10;&#10;Description automatically generated">
+          <p:cNvPr id="10" name="Picture 9" descr="A close up of text on a white background&#10;&#10;Description automatically generated">
             <a:extLst>
               <a:ext uri="{FF2B5EF4-FFF2-40B4-BE49-F238E27FC236}">
-                <a16:creationId xmlns:a16="http://schemas.microsoft.com/office/drawing/2014/main" id="{82AA2E05-7F36-4BF2-BBE8-4C4B251F48DA}"/>
+                <a16:creationId xmlns:a16="http://schemas.microsoft.com/office/drawing/2014/main" id="{970F0413-842C-433E-808F-C9528722382F}"/>
               </a:ext>
             </a:extLst>
           </p:cNvPr>
@@ -12246,16 +12455,15 @@
           </p:cNvPicPr>
           <p:nvPr/>
         </p:nvPicPr>
-        <p:blipFill>
+        <p:blipFill rotWithShape="1">
           <a:blip r:embed="rId2"/>
-          <a:stretch>
-            <a:fillRect/>
-          </a:stretch>
+          <a:srcRect r="6821"/>
+          <a:stretch/>
         </p:blipFill>
         <p:spPr>
           <a:xfrm>
-            <a:off x="30647" y="811728"/>
-            <a:ext cx="3956493" cy="2637662"/>
+            <a:off x="8339226" y="1623643"/>
+            <a:ext cx="3835242" cy="2743996"/>
           </a:xfrm>
           <a:prstGeom prst="rect">
             <a:avLst/>
@@ -12264,30 +12472,27 @@
       </p:pic>
       <p:pic>
         <p:nvPicPr>
-          <p:cNvPr id="14" name="Content Placeholder 13" descr="A screenshot of a cell phone&#10;&#10;Description automatically generated">
+          <p:cNvPr id="6" name="Picture 5" descr="A close up of a logo&#10;&#10;Description automatically generated">
             <a:extLst>
               <a:ext uri="{FF2B5EF4-FFF2-40B4-BE49-F238E27FC236}">
-                <a16:creationId xmlns:a16="http://schemas.microsoft.com/office/drawing/2014/main" id="{654CCB18-2262-4A25-8092-D75C66327E7D}"/>
+                <a16:creationId xmlns:a16="http://schemas.microsoft.com/office/drawing/2014/main" id="{90D0A457-0E8A-4B26-9B5E-B7CC374853D1}"/>
               </a:ext>
             </a:extLst>
           </p:cNvPr>
           <p:cNvPicPr>
-            <a:picLocks noGrp="1" noChangeAspect="1"/>
+            <a:picLocks noChangeAspect="1"/>
           </p:cNvPicPr>
-          <p:nvPr>
-            <p:ph sz="half" idx="1"/>
-          </p:nvPr>
+          <p:nvPr/>
         </p:nvPicPr>
-        <p:blipFill>
+        <p:blipFill rotWithShape="1">
           <a:blip r:embed="rId3"/>
-          <a:stretch>
-            <a:fillRect/>
-          </a:stretch>
+          <a:srcRect r="3635"/>
+          <a:stretch/>
         </p:blipFill>
         <p:spPr>
           <a:xfrm>
-            <a:off x="4092474" y="852351"/>
-            <a:ext cx="3956493" cy="2637662"/>
+            <a:off x="99493" y="51186"/>
+            <a:ext cx="4122451" cy="2851970"/>
           </a:xfrm>
           <a:prstGeom prst="rect">
             <a:avLst/>
@@ -12296,10 +12501,10 @@
       </p:pic>
       <p:pic>
         <p:nvPicPr>
-          <p:cNvPr id="16" name="Content Placeholder 15" descr="A close up of a logo&#10;&#10;Description automatically generated">
+          <p:cNvPr id="8" name="Picture 7" descr="A close up of a logo&#10;&#10;Description automatically generated">
             <a:extLst>
               <a:ext uri="{FF2B5EF4-FFF2-40B4-BE49-F238E27FC236}">
-                <a16:creationId xmlns:a16="http://schemas.microsoft.com/office/drawing/2014/main" id="{491D5911-EB26-4FD6-A446-AB16C4F5092A}"/>
+                <a16:creationId xmlns:a16="http://schemas.microsoft.com/office/drawing/2014/main" id="{E10DA690-DAB0-45D8-86F9-D6B5691AA7C3}"/>
               </a:ext>
             </a:extLst>
           </p:cNvPr>
@@ -12316,8 +12521,8 @@
         </p:blipFill>
         <p:spPr>
           <a:xfrm>
-            <a:off x="8238562" y="854260"/>
-            <a:ext cx="3871173" cy="2580782"/>
+            <a:off x="4350588" y="947108"/>
+            <a:ext cx="3952925" cy="2635283"/>
           </a:xfrm>
           <a:prstGeom prst="rect">
             <a:avLst/>
@@ -12326,10 +12531,10 @@
       </p:pic>
       <p:sp>
         <p:nvSpPr>
-          <p:cNvPr id="19" name="TextBox 18">
+          <p:cNvPr id="3" name="TextBox 2">
             <a:extLst>
               <a:ext uri="{FF2B5EF4-FFF2-40B4-BE49-F238E27FC236}">
-                <a16:creationId xmlns:a16="http://schemas.microsoft.com/office/drawing/2014/main" id="{D8DBD85C-0A82-4ACD-BDD0-F0BB8F69F8A7}"/>
+                <a16:creationId xmlns:a16="http://schemas.microsoft.com/office/drawing/2014/main" id="{2ADCDB36-AF26-4B95-9D41-A7526687B58C}"/>
               </a:ext>
             </a:extLst>
           </p:cNvPr>
@@ -12338,8 +12543,8 @@
         </p:nvSpPr>
         <p:spPr>
           <a:xfrm>
-            <a:off x="308275" y="158588"/>
-            <a:ext cx="3678865" cy="646331"/>
+            <a:off x="112838" y="5829790"/>
+            <a:ext cx="3678865" cy="923330"/>
           </a:xfrm>
           <a:prstGeom prst="rect">
             <a:avLst/>
@@ -12358,17 +12563,17 @@
                   <a:srgbClr val="FF0000"/>
                 </a:solidFill>
               </a:rPr>
-              <a:t>Placeholder image – need to update with updated X axis</a:t>
+              <a:t>*Should the Y axis be per capita?  The housing bar charts are not per capita</a:t>
             </a:r>
           </a:p>
         </p:txBody>
       </p:sp>
       <p:sp>
         <p:nvSpPr>
-          <p:cNvPr id="20" name="TextBox 19">
+          <p:cNvPr id="4" name="TextBox 3">
             <a:extLst>
               <a:ext uri="{FF2B5EF4-FFF2-40B4-BE49-F238E27FC236}">
-                <a16:creationId xmlns:a16="http://schemas.microsoft.com/office/drawing/2014/main" id="{AA093609-E779-48C4-A280-E8025D5C5830}"/>
+                <a16:creationId xmlns:a16="http://schemas.microsoft.com/office/drawing/2014/main" id="{71AD3E63-34E5-4C33-A170-A1D76F1EC444}"/>
               </a:ext>
             </a:extLst>
           </p:cNvPr>
@@ -12377,8 +12582,8 @@
         </p:nvSpPr>
         <p:spPr>
           <a:xfrm>
-            <a:off x="6826223" y="214176"/>
-            <a:ext cx="3871173" cy="646331"/>
+            <a:off x="3920347" y="5854160"/>
+            <a:ext cx="3871173" cy="923330"/>
           </a:xfrm>
           <a:prstGeom prst="rect">
             <a:avLst/>
@@ -12397,7 +12602,163 @@
                   <a:srgbClr val="FF0000"/>
                 </a:solidFill>
               </a:rPr>
-              <a:t>Consider displaying only 2 images for space – less than 300K and 300-500k</a:t>
+              <a:t>*Consider displaying only 2 images for space – less than 300K and 300-500k</a:t>
+            </a:r>
+          </a:p>
+        </p:txBody>
+      </p:sp>
+      <p:sp>
+        <p:nvSpPr>
+          <p:cNvPr id="7" name="TextBox 6">
+            <a:extLst>
+              <a:ext uri="{FF2B5EF4-FFF2-40B4-BE49-F238E27FC236}">
+                <a16:creationId xmlns:a16="http://schemas.microsoft.com/office/drawing/2014/main" id="{98806AAE-121F-411E-BA19-A8A4F0CB21D1}"/>
+              </a:ext>
+            </a:extLst>
+          </p:cNvPr>
+          <p:cNvSpPr txBox="1"/>
+          <p:nvPr/>
+        </p:nvSpPr>
+        <p:spPr>
+          <a:xfrm>
+            <a:off x="7858531" y="5879129"/>
+            <a:ext cx="3871173" cy="923330"/>
+          </a:xfrm>
+          <a:prstGeom prst="rect">
+            <a:avLst/>
+          </a:prstGeom>
+          <a:noFill/>
+        </p:spPr>
+        <p:txBody>
+          <a:bodyPr wrap="square" rtlCol="0">
+            <a:spAutoFit/>
+          </a:bodyPr>
+          <a:lstStyle/>
+          <a:p>
+            <a:r>
+              <a:rPr lang="en-US" b="1" dirty="0">
+                <a:solidFill>
+                  <a:srgbClr val="FF0000"/>
+                </a:solidFill>
+              </a:rPr>
+              <a:t>*Is this census data?  If so, may want to clarify while discussing this slide in the presentation </a:t>
+            </a:r>
+          </a:p>
+        </p:txBody>
+      </p:sp>
+      <p:sp>
+        <p:nvSpPr>
+          <p:cNvPr id="9" name="TextBox 8">
+            <a:extLst>
+              <a:ext uri="{FF2B5EF4-FFF2-40B4-BE49-F238E27FC236}">
+                <a16:creationId xmlns:a16="http://schemas.microsoft.com/office/drawing/2014/main" id="{F9EC634B-1089-4F6E-8DA6-C6BF8E8117DB}"/>
+              </a:ext>
+            </a:extLst>
+          </p:cNvPr>
+          <p:cNvSpPr txBox="1"/>
+          <p:nvPr/>
+        </p:nvSpPr>
+        <p:spPr>
+          <a:xfrm>
+            <a:off x="202020" y="-79786"/>
+            <a:ext cx="4371400" cy="369332"/>
+          </a:xfrm>
+          <a:prstGeom prst="rect">
+            <a:avLst/>
+          </a:prstGeom>
+          <a:noFill/>
+        </p:spPr>
+        <p:txBody>
+          <a:bodyPr wrap="square" rtlCol="0">
+            <a:spAutoFit/>
+          </a:bodyPr>
+          <a:lstStyle/>
+          <a:p>
+            <a:r>
+              <a:rPr lang="en-US" b="1" dirty="0">
+                <a:solidFill>
+                  <a:srgbClr val="FF0000"/>
+                </a:solidFill>
+              </a:rPr>
+              <a:t>*Update Image - Pending update</a:t>
+            </a:r>
+          </a:p>
+        </p:txBody>
+      </p:sp>
+      <p:sp>
+        <p:nvSpPr>
+          <p:cNvPr id="11" name="TextBox 10">
+            <a:extLst>
+              <a:ext uri="{FF2B5EF4-FFF2-40B4-BE49-F238E27FC236}">
+                <a16:creationId xmlns:a16="http://schemas.microsoft.com/office/drawing/2014/main" id="{8E4C76DF-4915-4347-9098-450488590816}"/>
+              </a:ext>
+            </a:extLst>
+          </p:cNvPr>
+          <p:cNvSpPr txBox="1"/>
+          <p:nvPr/>
+        </p:nvSpPr>
+        <p:spPr>
+          <a:xfrm>
+            <a:off x="4237195" y="762442"/>
+            <a:ext cx="4371400" cy="369332"/>
+          </a:xfrm>
+          <a:prstGeom prst="rect">
+            <a:avLst/>
+          </a:prstGeom>
+          <a:noFill/>
+        </p:spPr>
+        <p:txBody>
+          <a:bodyPr wrap="square" rtlCol="0">
+            <a:spAutoFit/>
+          </a:bodyPr>
+          <a:lstStyle/>
+          <a:p>
+            <a:r>
+              <a:rPr lang="en-US" b="1" dirty="0">
+                <a:solidFill>
+                  <a:srgbClr val="FF0000"/>
+                </a:solidFill>
+              </a:rPr>
+              <a:t>*Update Image - Pending update</a:t>
+            </a:r>
+          </a:p>
+        </p:txBody>
+      </p:sp>
+      <p:sp>
+        <p:nvSpPr>
+          <p:cNvPr id="12" name="TextBox 11">
+            <a:extLst>
+              <a:ext uri="{FF2B5EF4-FFF2-40B4-BE49-F238E27FC236}">
+                <a16:creationId xmlns:a16="http://schemas.microsoft.com/office/drawing/2014/main" id="{993F1D52-57E8-4AB4-B969-3CF9DE2499C8}"/>
+              </a:ext>
+            </a:extLst>
+          </p:cNvPr>
+          <p:cNvSpPr txBox="1"/>
+          <p:nvPr/>
+        </p:nvSpPr>
+        <p:spPr>
+          <a:xfrm>
+            <a:off x="8547222" y="1499818"/>
+            <a:ext cx="4371400" cy="369332"/>
+          </a:xfrm>
+          <a:prstGeom prst="rect">
+            <a:avLst/>
+          </a:prstGeom>
+          <a:noFill/>
+        </p:spPr>
+        <p:txBody>
+          <a:bodyPr wrap="square" rtlCol="0">
+            <a:spAutoFit/>
+          </a:bodyPr>
+          <a:lstStyle/>
+          <a:p>
+            <a:r>
+              <a:rPr lang="en-US" b="1" dirty="0">
+                <a:solidFill>
+                  <a:srgbClr val="FF0000"/>
+                </a:solidFill>
+              </a:rPr>
+              <a:t>*Update Image - Pending update</a:t>
             </a:r>
           </a:p>
         </p:txBody>
@@ -12405,7 +12766,7 @@
     </p:spTree>
     <p:extLst>
       <p:ext uri="{BB962C8B-B14F-4D97-AF65-F5344CB8AC3E}">
-        <p14:creationId xmlns:p14="http://schemas.microsoft.com/office/powerpoint/2010/main" val="159454353"/>
+        <p14:creationId xmlns:p14="http://schemas.microsoft.com/office/powerpoint/2010/main" val="297259918"/>
       </p:ext>
     </p:extLst>
   </p:cSld>
@@ -12442,6 +12803,567 @@
       </p:grpSpPr>
       <p:sp>
         <p:nvSpPr>
+          <p:cNvPr id="14" name="Rectangle 13">
+            <a:extLst>
+              <a:ext uri="{FF2B5EF4-FFF2-40B4-BE49-F238E27FC236}">
+                <a16:creationId xmlns:a16="http://schemas.microsoft.com/office/drawing/2014/main" id="{4F645BF8-7885-4398-80BC-4C0DF24F5CEE}"/>
+              </a:ext>
+              <a:ext uri="{C183D7F6-B498-43B3-948B-1728B52AA6E4}">
+                <adec:decorative xmlns:adec="http://schemas.microsoft.com/office/drawing/2017/decorative" val="1"/>
+              </a:ext>
+            </a:extLst>
+          </p:cNvPr>
+          <p:cNvSpPr>
+            <a:spLocks noGrp="1" noRot="1" noChangeAspect="1" noMove="1" noResize="1" noEditPoints="1" noAdjustHandles="1" noChangeArrowheads="1" noChangeShapeType="1" noTextEdit="1"/>
+          </p:cNvSpPr>
+          <p:nvPr>
+            <p:extLst>
+              <p:ext uri="{386F3935-93C4-4BCD-93E2-E3B085C9AB24}">
+                <p16:designElem xmlns:p16="http://schemas.microsoft.com/office/powerpoint/2015/main" val="1"/>
+              </p:ext>
+            </p:extLst>
+          </p:nvPr>
+        </p:nvSpPr>
+        <p:spPr>
+          <a:xfrm>
+            <a:off x="1" y="758952"/>
+            <a:ext cx="3443590" cy="5330952"/>
+          </a:xfrm>
+          <a:prstGeom prst="rect">
+            <a:avLst/>
+          </a:prstGeom>
+          <a:solidFill>
+            <a:schemeClr val="accent1"/>
+          </a:solidFill>
+          <a:ln>
+            <a:noFill/>
+          </a:ln>
+        </p:spPr>
+        <p:style>
+          <a:lnRef idx="2">
+            <a:schemeClr val="accent1">
+              <a:shade val="50000"/>
+            </a:schemeClr>
+          </a:lnRef>
+          <a:fillRef idx="1">
+            <a:schemeClr val="accent1"/>
+          </a:fillRef>
+          <a:effectRef idx="0">
+            <a:schemeClr val="accent1"/>
+          </a:effectRef>
+          <a:fontRef idx="minor">
+            <a:schemeClr val="lt1"/>
+          </a:fontRef>
+        </p:style>
+      </p:sp>
+      <p:sp>
+        <p:nvSpPr>
+          <p:cNvPr id="16" name="Rectangle 15">
+            <a:extLst>
+              <a:ext uri="{FF2B5EF4-FFF2-40B4-BE49-F238E27FC236}">
+                <a16:creationId xmlns:a16="http://schemas.microsoft.com/office/drawing/2014/main" id="{3212FB65-CD2B-4005-B910-132DCE19FCC7}"/>
+              </a:ext>
+              <a:ext uri="{C183D7F6-B498-43B3-948B-1728B52AA6E4}">
+                <adec:decorative xmlns:adec="http://schemas.microsoft.com/office/drawing/2017/decorative" val="1"/>
+              </a:ext>
+            </a:extLst>
+          </p:cNvPr>
+          <p:cNvSpPr>
+            <a:spLocks noGrp="1" noRot="1" noChangeAspect="1" noMove="1" noResize="1" noEditPoints="1" noAdjustHandles="1" noChangeArrowheads="1" noChangeShapeType="1" noTextEdit="1"/>
+          </p:cNvSpPr>
+          <p:nvPr>
+            <p:extLst>
+              <p:ext uri="{386F3935-93C4-4BCD-93E2-E3B085C9AB24}">
+                <p16:designElem xmlns:p16="http://schemas.microsoft.com/office/powerpoint/2015/main" val="1"/>
+              </p:ext>
+            </p:extLst>
+          </p:nvPr>
+        </p:nvSpPr>
+        <p:spPr>
+          <a:xfrm>
+            <a:off x="11815864" y="758952"/>
+            <a:ext cx="384048" cy="5330952"/>
+          </a:xfrm>
+          <a:prstGeom prst="rect">
+            <a:avLst/>
+          </a:prstGeom>
+          <a:solidFill>
+            <a:srgbClr val="C8C8C8">
+              <a:alpha val="49804"/>
+            </a:srgbClr>
+          </a:solidFill>
+          <a:ln>
+            <a:noFill/>
+          </a:ln>
+        </p:spPr>
+        <p:style>
+          <a:lnRef idx="2">
+            <a:schemeClr val="accent1">
+              <a:shade val="50000"/>
+            </a:schemeClr>
+          </a:lnRef>
+          <a:fillRef idx="1">
+            <a:schemeClr val="accent1"/>
+          </a:fillRef>
+          <a:effectRef idx="0">
+            <a:schemeClr val="accent1"/>
+          </a:effectRef>
+          <a:fontRef idx="minor">
+            <a:schemeClr val="lt1"/>
+          </a:fontRef>
+        </p:style>
+      </p:sp>
+      <p:sp useBgFill="1">
+        <p:nvSpPr>
+          <p:cNvPr id="18" name="Rectangle 17">
+            <a:extLst>
+              <a:ext uri="{FF2B5EF4-FFF2-40B4-BE49-F238E27FC236}">
+                <a16:creationId xmlns:a16="http://schemas.microsoft.com/office/drawing/2014/main" id="{B5DC95B7-2A72-483B-BA19-2BE751205541}"/>
+              </a:ext>
+              <a:ext uri="{C183D7F6-B498-43B3-948B-1728B52AA6E4}">
+                <adec:decorative xmlns:adec="http://schemas.microsoft.com/office/drawing/2017/decorative" val="1"/>
+              </a:ext>
+            </a:extLst>
+          </p:cNvPr>
+          <p:cNvSpPr>
+            <a:spLocks noGrp="1" noRot="1" noChangeAspect="1" noMove="1" noResize="1" noEditPoints="1" noAdjustHandles="1" noChangeArrowheads="1" noChangeShapeType="1" noTextEdit="1"/>
+          </p:cNvSpPr>
+          <p:nvPr>
+            <p:extLst>
+              <p:ext uri="{386F3935-93C4-4BCD-93E2-E3B085C9AB24}">
+                <p16:designElem xmlns:p16="http://schemas.microsoft.com/office/powerpoint/2015/main" val="1"/>
+              </p:ext>
+            </p:extLst>
+          </p:nvPr>
+        </p:nvSpPr>
+        <p:spPr>
+          <a:xfrm>
+            <a:off x="0" y="0"/>
+            <a:ext cx="12192000" cy="6858000"/>
+          </a:xfrm>
+          <a:prstGeom prst="rect">
+            <a:avLst/>
+          </a:prstGeom>
+          <a:ln>
+            <a:noFill/>
+          </a:ln>
+        </p:spPr>
+        <p:style>
+          <a:lnRef idx="2">
+            <a:schemeClr val="accent1">
+              <a:shade val="50000"/>
+            </a:schemeClr>
+          </a:lnRef>
+          <a:fillRef idx="1">
+            <a:schemeClr val="accent1"/>
+          </a:fillRef>
+          <a:effectRef idx="0">
+            <a:schemeClr val="accent1"/>
+          </a:effectRef>
+          <a:fontRef idx="minor">
+            <a:schemeClr val="lt1"/>
+          </a:fontRef>
+        </p:style>
+        <p:txBody>
+          <a:bodyPr rtlCol="0" anchor="ctr"/>
+          <a:lstStyle/>
+          <a:p>
+            <a:pPr algn="ctr"/>
+            <a:endParaRPr lang="en-US"/>
+          </a:p>
+        </p:txBody>
+      </p:sp>
+      <p:sp>
+        <p:nvSpPr>
+          <p:cNvPr id="20" name="Rectangle 19">
+            <a:extLst>
+              <a:ext uri="{FF2B5EF4-FFF2-40B4-BE49-F238E27FC236}">
+                <a16:creationId xmlns:a16="http://schemas.microsoft.com/office/drawing/2014/main" id="{1C822AFE-7E96-4A51-9E55-FCAEACD21357}"/>
+              </a:ext>
+              <a:ext uri="{C183D7F6-B498-43B3-948B-1728B52AA6E4}">
+                <adec:decorative xmlns:adec="http://schemas.microsoft.com/office/drawing/2017/decorative" val="1"/>
+              </a:ext>
+            </a:extLst>
+          </p:cNvPr>
+          <p:cNvSpPr>
+            <a:spLocks noGrp="1" noRot="1" noChangeAspect="1" noMove="1" noResize="1" noEditPoints="1" noAdjustHandles="1" noChangeArrowheads="1" noChangeShapeType="1" noTextEdit="1"/>
+          </p:cNvSpPr>
+          <p:nvPr>
+            <p:extLst>
+              <p:ext uri="{386F3935-93C4-4BCD-93E2-E3B085C9AB24}">
+                <p16:designElem xmlns:p16="http://schemas.microsoft.com/office/powerpoint/2015/main" val="1"/>
+              </p:ext>
+            </p:extLst>
+          </p:nvPr>
+        </p:nvSpPr>
+        <p:spPr>
+          <a:xfrm>
+            <a:off x="7850120" y="757325"/>
+            <a:ext cx="4341880" cy="5329325"/>
+          </a:xfrm>
+          <a:prstGeom prst="rect">
+            <a:avLst/>
+          </a:prstGeom>
+          <a:solidFill>
+            <a:schemeClr val="accent1"/>
+          </a:solidFill>
+          <a:ln>
+            <a:noFill/>
+          </a:ln>
+        </p:spPr>
+        <p:style>
+          <a:lnRef idx="2">
+            <a:schemeClr val="accent1">
+              <a:shade val="50000"/>
+            </a:schemeClr>
+          </a:lnRef>
+          <a:fillRef idx="1">
+            <a:schemeClr val="accent1"/>
+          </a:fillRef>
+          <a:effectRef idx="0">
+            <a:schemeClr val="accent1"/>
+          </a:effectRef>
+          <a:fontRef idx="minor">
+            <a:schemeClr val="lt1"/>
+          </a:fontRef>
+        </p:style>
+        <p:txBody>
+          <a:bodyPr rtlCol="0" anchor="ctr"/>
+          <a:lstStyle/>
+          <a:p>
+            <a:pPr algn="ctr"/>
+            <a:endParaRPr lang="en-US"/>
+          </a:p>
+        </p:txBody>
+      </p:sp>
+      <p:sp>
+        <p:nvSpPr>
+          <p:cNvPr id="5" name="Title 4">
+            <a:extLst>
+              <a:ext uri="{FF2B5EF4-FFF2-40B4-BE49-F238E27FC236}">
+                <a16:creationId xmlns:a16="http://schemas.microsoft.com/office/drawing/2014/main" id="{3E1C62C6-1501-4C1D-8475-37DDFD235BEC}"/>
+              </a:ext>
+            </a:extLst>
+          </p:cNvPr>
+          <p:cNvSpPr>
+            <a:spLocks noGrp="1"/>
+          </p:cNvSpPr>
+          <p:nvPr>
+            <p:ph type="title"/>
+          </p:nvPr>
+        </p:nvSpPr>
+        <p:spPr>
+          <a:xfrm>
+            <a:off x="8038214" y="1079769"/>
+            <a:ext cx="3991074" cy="4683077"/>
+          </a:xfrm>
+        </p:spPr>
+        <p:txBody>
+          <a:bodyPr vert="horz" lIns="91440" tIns="45720" rIns="91440" bIns="45720" rtlCol="0" anchor="t">
+            <a:normAutofit/>
+          </a:bodyPr>
+          <a:lstStyle/>
+          <a:p>
+            <a:r>
+              <a:rPr lang="en-US" b="1" dirty="0"/>
+              <a:t>HOUSING UNITS SOLD vs CRIME RATE IN SUGAR LAND AND HOUSTON</a:t>
+            </a:r>
+          </a:p>
+        </p:txBody>
+      </p:sp>
+      <p:sp>
+        <p:nvSpPr>
+          <p:cNvPr id="22" name="Rectangle 21">
+            <a:extLst>
+              <a:ext uri="{FF2B5EF4-FFF2-40B4-BE49-F238E27FC236}">
+                <a16:creationId xmlns:a16="http://schemas.microsoft.com/office/drawing/2014/main" id="{9169EA61-C175-4B7E-807B-58199DEA7FB3}"/>
+              </a:ext>
+              <a:ext uri="{C183D7F6-B498-43B3-948B-1728B52AA6E4}">
+                <adec:decorative xmlns:adec="http://schemas.microsoft.com/office/drawing/2017/decorative" val="1"/>
+              </a:ext>
+            </a:extLst>
+          </p:cNvPr>
+          <p:cNvSpPr>
+            <a:spLocks noGrp="1" noRot="1" noChangeAspect="1" noMove="1" noResize="1" noEditPoints="1" noAdjustHandles="1" noChangeArrowheads="1" noChangeShapeType="1" noTextEdit="1"/>
+          </p:cNvSpPr>
+          <p:nvPr>
+            <p:extLst>
+              <p:ext uri="{386F3935-93C4-4BCD-93E2-E3B085C9AB24}">
+                <p16:designElem xmlns:p16="http://schemas.microsoft.com/office/powerpoint/2015/main" val="1"/>
+              </p:ext>
+            </p:extLst>
+          </p:nvPr>
+        </p:nvSpPr>
+        <p:spPr>
+          <a:xfrm>
+            <a:off x="0" y="758952"/>
+            <a:ext cx="384048" cy="5330952"/>
+          </a:xfrm>
+          <a:prstGeom prst="rect">
+            <a:avLst/>
+          </a:prstGeom>
+          <a:solidFill>
+            <a:srgbClr val="C8C8C8">
+              <a:alpha val="49804"/>
+            </a:srgbClr>
+          </a:solidFill>
+          <a:ln>
+            <a:noFill/>
+          </a:ln>
+        </p:spPr>
+        <p:style>
+          <a:lnRef idx="2">
+            <a:schemeClr val="accent1">
+              <a:shade val="50000"/>
+            </a:schemeClr>
+          </a:lnRef>
+          <a:fillRef idx="1">
+            <a:schemeClr val="accent1"/>
+          </a:fillRef>
+          <a:effectRef idx="0">
+            <a:schemeClr val="accent1"/>
+          </a:effectRef>
+          <a:fontRef idx="minor">
+            <a:schemeClr val="lt1"/>
+          </a:fontRef>
+        </p:style>
+      </p:sp>
+      <p:cxnSp>
+        <p:nvCxnSpPr>
+          <p:cNvPr id="17" name="Straight Connector 16">
+            <a:extLst>
+              <a:ext uri="{FF2B5EF4-FFF2-40B4-BE49-F238E27FC236}">
+                <a16:creationId xmlns:a16="http://schemas.microsoft.com/office/drawing/2014/main" id="{B2C2B097-9CF4-40F0-A48F-4319EA04AECB}"/>
+              </a:ext>
+            </a:extLst>
+          </p:cNvPr>
+          <p:cNvCxnSpPr/>
+          <p:nvPr/>
+        </p:nvCxnSpPr>
+        <p:spPr>
+          <a:xfrm>
+            <a:off x="0" y="758952"/>
+            <a:ext cx="12199912" cy="0"/>
+          </a:xfrm>
+          <a:prstGeom prst="line">
+            <a:avLst/>
+          </a:prstGeom>
+          <a:ln w="19050">
+            <a:solidFill>
+              <a:schemeClr val="bg2">
+                <a:lumMod val="60000"/>
+                <a:lumOff val="40000"/>
+              </a:schemeClr>
+            </a:solidFill>
+          </a:ln>
+        </p:spPr>
+        <p:style>
+          <a:lnRef idx="1">
+            <a:schemeClr val="accent1"/>
+          </a:lnRef>
+          <a:fillRef idx="0">
+            <a:schemeClr val="accent1"/>
+          </a:fillRef>
+          <a:effectRef idx="0">
+            <a:schemeClr val="accent1"/>
+          </a:effectRef>
+          <a:fontRef idx="minor">
+            <a:schemeClr val="tx1"/>
+          </a:fontRef>
+        </p:style>
+      </p:cxnSp>
+      <p:cxnSp>
+        <p:nvCxnSpPr>
+          <p:cNvPr id="19" name="Straight Connector 18">
+            <a:extLst>
+              <a:ext uri="{FF2B5EF4-FFF2-40B4-BE49-F238E27FC236}">
+                <a16:creationId xmlns:a16="http://schemas.microsoft.com/office/drawing/2014/main" id="{6D25B33E-3330-4C6B-B59C-196B19C65F48}"/>
+              </a:ext>
+            </a:extLst>
+          </p:cNvPr>
+          <p:cNvCxnSpPr/>
+          <p:nvPr/>
+        </p:nvCxnSpPr>
+        <p:spPr>
+          <a:xfrm>
+            <a:off x="-7914" y="6089904"/>
+            <a:ext cx="12199912" cy="0"/>
+          </a:xfrm>
+          <a:prstGeom prst="line">
+            <a:avLst/>
+          </a:prstGeom>
+          <a:ln w="19050">
+            <a:solidFill>
+              <a:schemeClr val="bg2">
+                <a:lumMod val="60000"/>
+                <a:lumOff val="40000"/>
+              </a:schemeClr>
+            </a:solidFill>
+          </a:ln>
+        </p:spPr>
+        <p:style>
+          <a:lnRef idx="1">
+            <a:schemeClr val="accent1"/>
+          </a:lnRef>
+          <a:fillRef idx="0">
+            <a:schemeClr val="accent1"/>
+          </a:fillRef>
+          <a:effectRef idx="0">
+            <a:schemeClr val="accent1"/>
+          </a:effectRef>
+          <a:fontRef idx="minor">
+            <a:schemeClr val="tx1"/>
+          </a:fontRef>
+        </p:style>
+      </p:cxnSp>
+      <p:sp>
+        <p:nvSpPr>
+          <p:cNvPr id="12" name="TextBox 11">
+            <a:extLst>
+              <a:ext uri="{FF2B5EF4-FFF2-40B4-BE49-F238E27FC236}">
+                <a16:creationId xmlns:a16="http://schemas.microsoft.com/office/drawing/2014/main" id="{B8DAF411-80E2-44EB-9731-B8A429B76A08}"/>
+              </a:ext>
+            </a:extLst>
+          </p:cNvPr>
+          <p:cNvSpPr txBox="1"/>
+          <p:nvPr/>
+        </p:nvSpPr>
+        <p:spPr>
+          <a:xfrm>
+            <a:off x="-7914" y="2757"/>
+            <a:ext cx="3678865" cy="923330"/>
+          </a:xfrm>
+          <a:prstGeom prst="rect">
+            <a:avLst/>
+          </a:prstGeom>
+          <a:noFill/>
+        </p:spPr>
+        <p:txBody>
+          <a:bodyPr wrap="square" rtlCol="0">
+            <a:spAutoFit/>
+          </a:bodyPr>
+          <a:lstStyle/>
+          <a:p>
+            <a:r>
+              <a:rPr lang="en-US" b="1" dirty="0">
+                <a:solidFill>
+                  <a:srgbClr val="FF0000"/>
+                </a:solidFill>
+              </a:rPr>
+              <a:t>*Should the Y axis be per capita?  The housing bar charts are not per capita</a:t>
+            </a:r>
+          </a:p>
+        </p:txBody>
+      </p:sp>
+      <p:pic>
+        <p:nvPicPr>
+          <p:cNvPr id="24" name="Picture 23" descr="A screenshot of a cell phone&#10;&#10;Description automatically generated">
+            <a:extLst>
+              <a:ext uri="{FF2B5EF4-FFF2-40B4-BE49-F238E27FC236}">
+                <a16:creationId xmlns:a16="http://schemas.microsoft.com/office/drawing/2014/main" id="{14CB80E6-7CF1-4DE0-8588-D8748C448B5C}"/>
+              </a:ext>
+            </a:extLst>
+          </p:cNvPr>
+          <p:cNvPicPr>
+            <a:picLocks noChangeAspect="1"/>
+          </p:cNvPicPr>
+          <p:nvPr/>
+        </p:nvPicPr>
+        <p:blipFill>
+          <a:blip r:embed="rId3"/>
+          <a:stretch>
+            <a:fillRect/>
+          </a:stretch>
+        </p:blipFill>
+        <p:spPr>
+          <a:xfrm>
+            <a:off x="504852" y="845816"/>
+            <a:ext cx="7117907" cy="5152341"/>
+          </a:xfrm>
+          <a:prstGeom prst="rect">
+            <a:avLst/>
+          </a:prstGeom>
+        </p:spPr>
+      </p:pic>
+      <p:sp>
+        <p:nvSpPr>
+          <p:cNvPr id="26" name="TextBox 25">
+            <a:extLst>
+              <a:ext uri="{FF2B5EF4-FFF2-40B4-BE49-F238E27FC236}">
+                <a16:creationId xmlns:a16="http://schemas.microsoft.com/office/drawing/2014/main" id="{43B323D0-5F2C-43EC-95DB-0758E4C6A4DD}"/>
+              </a:ext>
+            </a:extLst>
+          </p:cNvPr>
+          <p:cNvSpPr txBox="1"/>
+          <p:nvPr/>
+        </p:nvSpPr>
+        <p:spPr>
+          <a:xfrm>
+            <a:off x="2164092" y="1069137"/>
+            <a:ext cx="4371400" cy="369332"/>
+          </a:xfrm>
+          <a:prstGeom prst="rect">
+            <a:avLst/>
+          </a:prstGeom>
+          <a:noFill/>
+        </p:spPr>
+        <p:txBody>
+          <a:bodyPr wrap="square" rtlCol="0">
+            <a:spAutoFit/>
+          </a:bodyPr>
+          <a:lstStyle/>
+          <a:p>
+            <a:r>
+              <a:rPr lang="en-US" b="1" dirty="0">
+                <a:solidFill>
+                  <a:srgbClr val="FF0000"/>
+                </a:solidFill>
+              </a:rPr>
+              <a:t>*Update Image - Pending update</a:t>
+            </a:r>
+          </a:p>
+        </p:txBody>
+      </p:sp>
+    </p:spTree>
+    <p:extLst>
+      <p:ext uri="{BB962C8B-B14F-4D97-AF65-F5344CB8AC3E}">
+        <p14:creationId xmlns:p14="http://schemas.microsoft.com/office/powerpoint/2010/main" val="4120338722"/>
+      </p:ext>
+    </p:extLst>
+  </p:cSld>
+  <p:clrMapOvr>
+    <a:masterClrMapping/>
+  </p:clrMapOvr>
+</p:sld>
+</file>
+
+<file path=ppt/slides/slide18.xml><?xml version="1.0" encoding="utf-8"?>
+<p:sld xmlns:a="http://schemas.openxmlformats.org/drawingml/2006/main" xmlns:r="http://schemas.openxmlformats.org/officeDocument/2006/relationships" xmlns:p="http://schemas.openxmlformats.org/presentationml/2006/main">
+  <p:cSld>
+    <p:bg>
+      <p:bgPr>
+        <a:solidFill>
+          <a:schemeClr val="bg1"/>
+        </a:solidFill>
+        <a:effectLst/>
+      </p:bgPr>
+    </p:bg>
+    <p:spTree>
+      <p:nvGrpSpPr>
+        <p:cNvPr id="1" name=""/>
+        <p:cNvGrpSpPr/>
+        <p:nvPr/>
+      </p:nvGrpSpPr>
+      <p:grpSpPr>
+        <a:xfrm>
+          <a:off x="0" y="0"/>
+          <a:ext cx="0" cy="0"/>
+          <a:chOff x="0" y="0"/>
+          <a:chExt cx="0" cy="0"/>
+        </a:xfrm>
+      </p:grpSpPr>
+      <p:sp>
+        <p:nvSpPr>
           <p:cNvPr id="67" name="Rectangle 49">
             <a:extLst>
               <a:ext uri="{FF2B5EF4-FFF2-40B4-BE49-F238E27FC236}">
@@ -13216,7 +14138,7 @@
 </p:sld>
 </file>
 
-<file path=ppt/slides/slide18.xml><?xml version="1.0" encoding="utf-8"?>
+<file path=ppt/slides/slide19.xml><?xml version="1.0" encoding="utf-8"?>
 <p:sld xmlns:a="http://schemas.openxmlformats.org/drawingml/2006/main" xmlns:r="http://schemas.openxmlformats.org/officeDocument/2006/relationships" xmlns:p="http://schemas.openxmlformats.org/presentationml/2006/main">
   <p:cSld>
     <p:bg>
@@ -14181,7 +15103,7 @@
             <a:fld id="{8C2E478F-E849-4A8C-AF1F-CBCC78A7CBFA}" type="slidenum">
               <a:rPr lang="en-US" smtClean="0"/>
               <a:pPr/>
-              <a:t>18</a:t>
+              <a:t>19</a:t>
             </a:fld>
             <a:endParaRPr lang="en-US" dirty="0"/>
           </a:p>
@@ -17575,233 +18497,6 @@
       </p:grpSpPr>
       <p:sp>
         <p:nvSpPr>
-          <p:cNvPr id="21" name="Rectangle 20">
-            <a:extLst>
-              <a:ext uri="{FF2B5EF4-FFF2-40B4-BE49-F238E27FC236}">
-                <a16:creationId xmlns:a16="http://schemas.microsoft.com/office/drawing/2014/main" id="{DB8424AB-D56B-4256-866A-5B54DE93C20F}"/>
-              </a:ext>
-              <a:ext uri="{C183D7F6-B498-43B3-948B-1728B52AA6E4}">
-                <adec:decorative xmlns:adec="http://schemas.microsoft.com/office/drawing/2017/decorative" val="1"/>
-              </a:ext>
-            </a:extLst>
-          </p:cNvPr>
-          <p:cNvSpPr>
-            <a:spLocks noGrp="1" noRot="1" noChangeAspect="1" noMove="1" noResize="1" noEditPoints="1" noAdjustHandles="1" noChangeArrowheads="1" noChangeShapeType="1" noTextEdit="1"/>
-          </p:cNvSpPr>
-          <p:nvPr>
-            <p:extLst>
-              <p:ext uri="{386F3935-93C4-4BCD-93E2-E3B085C9AB24}">
-                <p16:designElem xmlns:p16="http://schemas.microsoft.com/office/powerpoint/2015/main" val="1"/>
-              </p:ext>
-            </p:extLst>
-          </p:nvPr>
-        </p:nvSpPr>
-        <p:spPr>
-          <a:xfrm>
-            <a:off x="0" y="761999"/>
-            <a:ext cx="9141619" cy="5334001"/>
-          </a:xfrm>
-          <a:prstGeom prst="rect">
-            <a:avLst/>
-          </a:prstGeom>
-          <a:solidFill>
-            <a:schemeClr val="accent1"/>
-          </a:solidFill>
-          <a:ln>
-            <a:noFill/>
-          </a:ln>
-        </p:spPr>
-        <p:style>
-          <a:lnRef idx="2">
-            <a:schemeClr val="accent1">
-              <a:shade val="50000"/>
-            </a:schemeClr>
-          </a:lnRef>
-          <a:fillRef idx="1">
-            <a:schemeClr val="accent1"/>
-          </a:fillRef>
-          <a:effectRef idx="0">
-            <a:schemeClr val="accent1"/>
-          </a:effectRef>
-          <a:fontRef idx="minor">
-            <a:schemeClr val="lt1"/>
-          </a:fontRef>
-        </p:style>
-      </p:sp>
-      <p:sp>
-        <p:nvSpPr>
-          <p:cNvPr id="23" name="Rectangle 22">
-            <a:extLst>
-              <a:ext uri="{FF2B5EF4-FFF2-40B4-BE49-F238E27FC236}">
-                <a16:creationId xmlns:a16="http://schemas.microsoft.com/office/drawing/2014/main" id="{FC999C28-AD33-4EB7-A5F1-C06D10A5FDF7}"/>
-              </a:ext>
-              <a:ext uri="{C183D7F6-B498-43B3-948B-1728B52AA6E4}">
-                <adec:decorative xmlns:adec="http://schemas.microsoft.com/office/drawing/2017/decorative" val="1"/>
-              </a:ext>
-            </a:extLst>
-          </p:cNvPr>
-          <p:cNvSpPr>
-            <a:spLocks noGrp="1" noRot="1" noChangeAspect="1" noMove="1" noResize="1" noEditPoints="1" noAdjustHandles="1" noChangeArrowheads="1" noChangeShapeType="1" noTextEdit="1"/>
-          </p:cNvSpPr>
-          <p:nvPr>
-            <p:extLst>
-              <p:ext uri="{386F3935-93C4-4BCD-93E2-E3B085C9AB24}">
-                <p16:designElem xmlns:p16="http://schemas.microsoft.com/office/powerpoint/2015/main" val="1"/>
-              </p:ext>
-            </p:extLst>
-          </p:nvPr>
-        </p:nvSpPr>
-        <p:spPr>
-          <a:xfrm>
-            <a:off x="9270263" y="761999"/>
-            <a:ext cx="2925318" cy="5334001"/>
-          </a:xfrm>
-          <a:prstGeom prst="rect">
-            <a:avLst/>
-          </a:prstGeom>
-          <a:solidFill>
-            <a:srgbClr val="C8C8C8">
-              <a:alpha val="49804"/>
-            </a:srgbClr>
-          </a:solidFill>
-          <a:ln>
-            <a:noFill/>
-          </a:ln>
-        </p:spPr>
-        <p:style>
-          <a:lnRef idx="2">
-            <a:schemeClr val="accent1">
-              <a:shade val="50000"/>
-            </a:schemeClr>
-          </a:lnRef>
-          <a:fillRef idx="1">
-            <a:schemeClr val="accent1"/>
-          </a:fillRef>
-          <a:effectRef idx="0">
-            <a:schemeClr val="accent1"/>
-          </a:effectRef>
-          <a:fontRef idx="minor">
-            <a:schemeClr val="lt1"/>
-          </a:fontRef>
-        </p:style>
-      </p:sp>
-      <p:sp useBgFill="1">
-        <p:nvSpPr>
-          <p:cNvPr id="25" name="Rectangle 24">
-            <a:extLst>
-              <a:ext uri="{FF2B5EF4-FFF2-40B4-BE49-F238E27FC236}">
-                <a16:creationId xmlns:a16="http://schemas.microsoft.com/office/drawing/2014/main" id="{0864E5C9-52C9-4572-AC75-548B9B9C2648}"/>
-              </a:ext>
-              <a:ext uri="{C183D7F6-B498-43B3-948B-1728B52AA6E4}">
-                <adec:decorative xmlns:adec="http://schemas.microsoft.com/office/drawing/2017/decorative" val="1"/>
-              </a:ext>
-            </a:extLst>
-          </p:cNvPr>
-          <p:cNvSpPr>
-            <a:spLocks noGrp="1" noRot="1" noChangeAspect="1" noMove="1" noResize="1" noEditPoints="1" noAdjustHandles="1" noChangeArrowheads="1" noChangeShapeType="1" noTextEdit="1"/>
-          </p:cNvSpPr>
-          <p:nvPr>
-            <p:extLst>
-              <p:ext uri="{386F3935-93C4-4BCD-93E2-E3B085C9AB24}">
-                <p16:designElem xmlns:p16="http://schemas.microsoft.com/office/powerpoint/2015/main" val="1"/>
-              </p:ext>
-            </p:extLst>
-          </p:nvPr>
-        </p:nvSpPr>
-        <p:spPr>
-          <a:xfrm>
-            <a:off x="0" y="0"/>
-            <a:ext cx="12191999" cy="6858000"/>
-          </a:xfrm>
-          <a:prstGeom prst="rect">
-            <a:avLst/>
-          </a:prstGeom>
-          <a:ln>
-            <a:noFill/>
-          </a:ln>
-        </p:spPr>
-        <p:style>
-          <a:lnRef idx="2">
-            <a:schemeClr val="accent1">
-              <a:shade val="50000"/>
-            </a:schemeClr>
-          </a:lnRef>
-          <a:fillRef idx="1">
-            <a:schemeClr val="accent1"/>
-          </a:fillRef>
-          <a:effectRef idx="0">
-            <a:schemeClr val="accent1"/>
-          </a:effectRef>
-          <a:fontRef idx="minor">
-            <a:schemeClr val="lt1"/>
-          </a:fontRef>
-        </p:style>
-        <p:txBody>
-          <a:bodyPr rtlCol="0" anchor="ctr"/>
-          <a:lstStyle/>
-          <a:p>
-            <a:pPr algn="ctr"/>
-            <a:endParaRPr lang="en-US"/>
-          </a:p>
-        </p:txBody>
-      </p:sp>
-      <p:sp>
-        <p:nvSpPr>
-          <p:cNvPr id="27" name="Rectangle 26">
-            <a:extLst>
-              <a:ext uri="{FF2B5EF4-FFF2-40B4-BE49-F238E27FC236}">
-                <a16:creationId xmlns:a16="http://schemas.microsoft.com/office/drawing/2014/main" id="{45CC6500-4DBD-4C34-BC14-2387FB483BEB}"/>
-              </a:ext>
-              <a:ext uri="{C183D7F6-B498-43B3-948B-1728B52AA6E4}">
-                <adec:decorative xmlns:adec="http://schemas.microsoft.com/office/drawing/2017/decorative" val="1"/>
-              </a:ext>
-            </a:extLst>
-          </p:cNvPr>
-          <p:cNvSpPr>
-            <a:spLocks noGrp="1" noRot="1" noChangeAspect="1" noMove="1" noResize="1" noEditPoints="1" noAdjustHandles="1" noChangeArrowheads="1" noChangeShapeType="1" noTextEdit="1"/>
-          </p:cNvSpPr>
-          <p:nvPr>
-            <p:extLst>
-              <p:ext uri="{386F3935-93C4-4BCD-93E2-E3B085C9AB24}">
-                <p16:designElem xmlns:p16="http://schemas.microsoft.com/office/powerpoint/2015/main" val="1"/>
-              </p:ext>
-            </p:extLst>
-          </p:nvPr>
-        </p:nvSpPr>
-        <p:spPr>
-          <a:xfrm>
-            <a:off x="1" y="761999"/>
-            <a:ext cx="4642228" cy="5334001"/>
-          </a:xfrm>
-          <a:prstGeom prst="rect">
-            <a:avLst/>
-          </a:prstGeom>
-          <a:solidFill>
-            <a:schemeClr val="accent1"/>
-          </a:solidFill>
-          <a:ln>
-            <a:noFill/>
-          </a:ln>
-        </p:spPr>
-        <p:style>
-          <a:lnRef idx="2">
-            <a:schemeClr val="accent1">
-              <a:shade val="50000"/>
-            </a:schemeClr>
-          </a:lnRef>
-          <a:fillRef idx="1">
-            <a:schemeClr val="accent1"/>
-          </a:fillRef>
-          <a:effectRef idx="0">
-            <a:schemeClr val="accent1"/>
-          </a:effectRef>
-          <a:fontRef idx="minor">
-            <a:schemeClr val="lt1"/>
-          </a:fontRef>
-        </p:style>
-      </p:sp>
-      <p:sp>
-        <p:nvSpPr>
           <p:cNvPr id="2" name="Title 1">
             <a:extLst>
               <a:ext uri="{FF2B5EF4-FFF2-40B4-BE49-F238E27FC236}">
@@ -17816,23 +18511,18 @@
             <p:ph type="title"/>
           </p:nvPr>
         </p:nvSpPr>
-        <p:spPr>
-          <a:xfrm>
-            <a:off x="691771" y="1796796"/>
-            <a:ext cx="3258688" cy="3255264"/>
-          </a:xfrm>
-        </p:spPr>
+        <p:spPr/>
         <p:txBody>
-          <a:bodyPr vert="horz" lIns="91440" tIns="45720" rIns="91440" bIns="45720" rtlCol="0" anchor="b">
+          <a:bodyPr vert="horz" lIns="91440" tIns="45720" rIns="91440" bIns="45720" rtlCol="0" anchor="ctr">
             <a:normAutofit/>
           </a:bodyPr>
           <a:lstStyle/>
           <a:p>
             <a:r>
-              <a:rPr lang="en-US" sz="4600" b="1" spc="-100" dirty="0"/>
+              <a:rPr lang="en-US" sz="4000" b="1" spc="-100" dirty="0"/>
               <a:t>TOTAL CRIME AVG. PER CAPITA IN CITIES</a:t>
             </a:r>
-            <a:endParaRPr lang="en-US" sz="4600" spc="-100" dirty="0"/>
+            <a:endParaRPr lang="en-US" sz="4000" spc="-100" dirty="0"/>
           </a:p>
         </p:txBody>
       </p:sp>
@@ -17851,77 +18541,20 @@
           <p:nvPr/>
         </p:nvPicPr>
         <p:blipFill rotWithShape="1">
-          <a:blip r:embed="rId2"/>
+          <a:blip r:embed="rId3"/>
           <a:srcRect l="6907" t="7287" r="9318" b="5891"/>
           <a:stretch/>
         </p:blipFill>
         <p:spPr>
           <a:xfrm>
-            <a:off x="4684761" y="1318342"/>
-            <a:ext cx="7044991" cy="4380711"/>
+            <a:off x="3572540" y="967381"/>
+            <a:ext cx="7944561" cy="4940081"/>
           </a:xfrm>
           <a:prstGeom prst="rect">
             <a:avLst/>
           </a:prstGeom>
         </p:spPr>
       </p:pic>
-      <p:sp>
-        <p:nvSpPr>
-          <p:cNvPr id="29" name="Rectangle 28">
-            <a:extLst>
-              <a:ext uri="{FF2B5EF4-FFF2-40B4-BE49-F238E27FC236}">
-                <a16:creationId xmlns:a16="http://schemas.microsoft.com/office/drawing/2014/main" id="{4E34A3B6-BAD2-4156-BDC6-4736248BFDE0}"/>
-              </a:ext>
-              <a:ext uri="{C183D7F6-B498-43B3-948B-1728B52AA6E4}">
-                <adec:decorative xmlns:adec="http://schemas.microsoft.com/office/drawing/2017/decorative" val="1"/>
-              </a:ext>
-            </a:extLst>
-          </p:cNvPr>
-          <p:cNvSpPr>
-            <a:spLocks noGrp="1" noRot="1" noChangeAspect="1" noMove="1" noResize="1" noEditPoints="1" noAdjustHandles="1" noChangeArrowheads="1" noChangeShapeType="1" noTextEdit="1"/>
-          </p:cNvSpPr>
-          <p:nvPr>
-            <p:extLst>
-              <p:ext uri="{386F3935-93C4-4BCD-93E2-E3B085C9AB24}">
-                <p16:designElem xmlns:p16="http://schemas.microsoft.com/office/powerpoint/2015/main" val="1"/>
-              </p:ext>
-            </p:extLst>
-          </p:nvPr>
-        </p:nvSpPr>
-        <p:spPr>
-          <a:xfrm>
-            <a:off x="11815864" y="758952"/>
-            <a:ext cx="384048" cy="5330952"/>
-          </a:xfrm>
-          <a:prstGeom prst="rect">
-            <a:avLst/>
-          </a:prstGeom>
-          <a:solidFill>
-            <a:srgbClr val="C8C8C8">
-              <a:alpha val="49804"/>
-            </a:srgbClr>
-          </a:solidFill>
-          <a:ln>
-            <a:noFill/>
-          </a:ln>
-        </p:spPr>
-        <p:style>
-          <a:lnRef idx="2">
-            <a:schemeClr val="accent1">
-              <a:shade val="50000"/>
-            </a:schemeClr>
-          </a:lnRef>
-          <a:fillRef idx="1">
-            <a:schemeClr val="accent1"/>
-          </a:fillRef>
-          <a:effectRef idx="0">
-            <a:schemeClr val="accent1"/>
-          </a:effectRef>
-          <a:fontRef idx="minor">
-            <a:schemeClr val="lt1"/>
-          </a:fontRef>
-        </p:style>
-      </p:sp>
       <p:cxnSp>
         <p:nvCxnSpPr>
           <p:cNvPr id="9" name="Straight Connector 8">

</xml_diff>

<commit_message>
Updated presentation - scatter plot diagrams
</commit_message>
<xml_diff>
--- a/Presentation/final draft.pptx
+++ b/Presentation/final draft.pptx
@@ -3347,7 +3347,7 @@
           <a:p>
             <a:fld id="{B9B6BCD5-E3BE-874C-A866-DD86D183A826}" type="datetimeFigureOut">
               <a:rPr lang="en-US" smtClean="0"/>
-              <a:t>9/21/2020</a:t>
+              <a:t>9/22/2020</a:t>
             </a:fld>
             <a:endParaRPr lang="en-US"/>
           </a:p>
@@ -5488,7 +5488,7 @@
             <a:fld id="{5586B75A-687E-405C-8A0B-8D00578BA2C3}" type="datetimeFigureOut">
               <a:rPr lang="en-US" smtClean="0"/>
               <a:pPr/>
-              <a:t>9/21/2020</a:t>
+              <a:t>9/22/2020</a:t>
             </a:fld>
             <a:endParaRPr lang="en-US" dirty="0"/>
           </a:p>
@@ -5660,7 +5660,7 @@
             <a:fld id="{5586B75A-687E-405C-8A0B-8D00578BA2C3}" type="datetimeFigureOut">
               <a:rPr lang="en-US" smtClean="0"/>
               <a:pPr/>
-              <a:t>9/21/2020</a:t>
+              <a:t>9/22/2020</a:t>
             </a:fld>
             <a:endParaRPr lang="en-US" dirty="0"/>
           </a:p>
@@ -5842,7 +5842,7 @@
             <a:fld id="{5586B75A-687E-405C-8A0B-8D00578BA2C3}" type="datetimeFigureOut">
               <a:rPr lang="en-US" smtClean="0"/>
               <a:pPr/>
-              <a:t>9/21/2020</a:t>
+              <a:t>9/22/2020</a:t>
             </a:fld>
             <a:endParaRPr lang="en-US" dirty="0"/>
           </a:p>
@@ -6678,7 +6678,7 @@
             <a:fld id="{5586B75A-687E-405C-8A0B-8D00578BA2C3}" type="datetimeFigureOut">
               <a:rPr lang="en-US" smtClean="0"/>
               <a:pPr/>
-              <a:t>9/21/2020</a:t>
+              <a:t>9/22/2020</a:t>
             </a:fld>
             <a:endParaRPr lang="en-US" dirty="0"/>
           </a:p>
@@ -6938,7 +6938,7 @@
             <a:fld id="{5586B75A-687E-405C-8A0B-8D00578BA2C3}" type="datetimeFigureOut">
               <a:rPr lang="en-US" smtClean="0"/>
               <a:pPr/>
-              <a:t>9/21/2020</a:t>
+              <a:t>9/22/2020</a:t>
             </a:fld>
             <a:endParaRPr lang="en-US" dirty="0"/>
           </a:p>
@@ -7228,7 +7228,7 @@
             <a:fld id="{5586B75A-687E-405C-8A0B-8D00578BA2C3}" type="datetimeFigureOut">
               <a:rPr lang="en-US" smtClean="0"/>
               <a:pPr/>
-              <a:t>9/21/2020</a:t>
+              <a:t>9/22/2020</a:t>
             </a:fld>
             <a:endParaRPr lang="en-US" dirty="0"/>
           </a:p>
@@ -7672,7 +7672,7 @@
             <a:fld id="{5586B75A-687E-405C-8A0B-8D00578BA2C3}" type="datetimeFigureOut">
               <a:rPr lang="en-US" smtClean="0"/>
               <a:pPr/>
-              <a:t>9/21/2020</a:t>
+              <a:t>9/22/2020</a:t>
             </a:fld>
             <a:endParaRPr lang="en-US" dirty="0"/>
           </a:p>
@@ -7792,7 +7792,7 @@
             <a:fld id="{5586B75A-687E-405C-8A0B-8D00578BA2C3}" type="datetimeFigureOut">
               <a:rPr lang="en-US" smtClean="0"/>
               <a:pPr/>
-              <a:t>9/21/2020</a:t>
+              <a:t>9/22/2020</a:t>
             </a:fld>
             <a:endParaRPr lang="en-US" dirty="0"/>
           </a:p>
@@ -7889,7 +7889,7 @@
             <a:fld id="{5586B75A-687E-405C-8A0B-8D00578BA2C3}" type="datetimeFigureOut">
               <a:rPr lang="en-US" smtClean="0"/>
               <a:pPr/>
-              <a:t>9/21/2020</a:t>
+              <a:t>9/22/2020</a:t>
             </a:fld>
             <a:endParaRPr lang="en-US" dirty="0"/>
           </a:p>
@@ -8179,7 +8179,7 @@
             <a:fld id="{5586B75A-687E-405C-8A0B-8D00578BA2C3}" type="datetimeFigureOut">
               <a:rPr lang="en-US" smtClean="0"/>
               <a:pPr/>
-              <a:t>9/21/2020</a:t>
+              <a:t>9/22/2020</a:t>
             </a:fld>
             <a:endParaRPr lang="en-US" dirty="0"/>
           </a:p>
@@ -8454,7 +8454,7 @@
             <a:fld id="{5586B75A-687E-405C-8A0B-8D00578BA2C3}" type="datetimeFigureOut">
               <a:rPr lang="en-US" smtClean="0"/>
               <a:pPr/>
-              <a:t>9/21/2020</a:t>
+              <a:t>9/22/2020</a:t>
             </a:fld>
             <a:endParaRPr lang="en-US" dirty="0"/>
           </a:p>
@@ -8754,7 +8754,7 @@
             <a:fld id="{5586B75A-687E-405C-8A0B-8D00578BA2C3}" type="datetimeFigureOut">
               <a:rPr lang="en-US" smtClean="0"/>
               <a:pPr/>
-              <a:t>9/21/2020</a:t>
+              <a:t>9/22/2020</a:t>
             </a:fld>
             <a:endParaRPr lang="en-US" dirty="0"/>
           </a:p>
@@ -11288,10 +11288,10 @@
       </p:sp>
       <p:pic>
         <p:nvPicPr>
-          <p:cNvPr id="4" name="Picture 3" descr="A screenshot of a cell phone&#10;&#10;Description automatically generated">
+          <p:cNvPr id="5" name="Picture 4" descr="A picture containing computer&#10;&#10;Description automatically generated">
             <a:extLst>
               <a:ext uri="{FF2B5EF4-FFF2-40B4-BE49-F238E27FC236}">
-                <a16:creationId xmlns:a16="http://schemas.microsoft.com/office/drawing/2014/main" id="{554F6D91-EE30-4987-AF73-38F7D234A377}"/>
+                <a16:creationId xmlns:a16="http://schemas.microsoft.com/office/drawing/2014/main" id="{3EC66BEF-65D4-4454-BAE5-ACA45D0BDBC6}"/>
               </a:ext>
             </a:extLst>
           </p:cNvPr>
@@ -11308,8 +11308,8 @@
         </p:blipFill>
         <p:spPr>
           <a:xfrm>
-            <a:off x="159492" y="284436"/>
-            <a:ext cx="5592726" cy="3866576"/>
+            <a:off x="218831" y="301717"/>
+            <a:ext cx="5629613" cy="3892078"/>
           </a:xfrm>
           <a:prstGeom prst="rect">
             <a:avLst/>
@@ -11321,10 +11321,10 @@
       </p:pic>
       <p:pic>
         <p:nvPicPr>
-          <p:cNvPr id="6" name="Picture 5" descr="A screenshot of a cell phone&#10;&#10;Description automatically generated">
+          <p:cNvPr id="8" name="Picture 7" descr="A screenshot of a cell phone&#10;&#10;Description automatically generated">
             <a:extLst>
               <a:ext uri="{FF2B5EF4-FFF2-40B4-BE49-F238E27FC236}">
-                <a16:creationId xmlns:a16="http://schemas.microsoft.com/office/drawing/2014/main" id="{CA8CFA1C-BACF-4BF1-A4BB-785FA4F8822C}"/>
+                <a16:creationId xmlns:a16="http://schemas.microsoft.com/office/drawing/2014/main" id="{D1224116-4424-4152-A466-AC372CE03C94}"/>
               </a:ext>
             </a:extLst>
           </p:cNvPr>
@@ -11335,13 +11335,13 @@
         </p:nvPicPr>
         <p:blipFill rotWithShape="1">
           <a:blip r:embed="rId3"/>
-          <a:srcRect t="3626"/>
+          <a:srcRect t="2346" r="6627"/>
           <a:stretch/>
         </p:blipFill>
         <p:spPr>
           <a:xfrm>
-            <a:off x="5996769" y="283548"/>
-            <a:ext cx="6018028" cy="3866576"/>
+            <a:off x="6280943" y="301717"/>
+            <a:ext cx="5629613" cy="3925164"/>
           </a:xfrm>
           <a:prstGeom prst="rect">
             <a:avLst/>

</xml_diff>